<commit_message>
added constructors that take shader source strings, updated network file format
</commit_message>
<xml_diff>
--- a/docs/nwt_format.pptx
+++ b/docs/nwt_format.pptx
@@ -8,6 +8,8 @@
     <p:sldId id="258" r:id="rId2"/>
     <p:sldId id="257" r:id="rId3"/>
     <p:sldId id="256" r:id="rId4"/>
+    <p:sldId id="260" r:id="rId5"/>
+    <p:sldId id="259" r:id="rId6"/>
   </p:sldIdLst>
   <p:sldSz cx="12192000" cy="6858000"/>
   <p:notesSz cx="6858000" cy="9144000"/>
@@ -243,7 +245,7 @@
           <a:p>
             <a:fld id="{6CC5352D-349F-485B-9CFD-C06486738278}" type="datetimeFigureOut">
               <a:rPr lang="en-US" smtClean="0"/>
-              <a:t>2/6/2023</a:t>
+              <a:t>4/18/2023</a:t>
             </a:fld>
             <a:endParaRPr lang="en-US"/>
           </a:p>
@@ -411,7 +413,7 @@
           <a:p>
             <a:fld id="{6CC5352D-349F-485B-9CFD-C06486738278}" type="datetimeFigureOut">
               <a:rPr lang="en-US" smtClean="0"/>
-              <a:t>2/6/2023</a:t>
+              <a:t>4/18/2023</a:t>
             </a:fld>
             <a:endParaRPr lang="en-US"/>
           </a:p>
@@ -589,7 +591,7 @@
           <a:p>
             <a:fld id="{6CC5352D-349F-485B-9CFD-C06486738278}" type="datetimeFigureOut">
               <a:rPr lang="en-US" smtClean="0"/>
-              <a:t>2/6/2023</a:t>
+              <a:t>4/18/2023</a:t>
             </a:fld>
             <a:endParaRPr lang="en-US"/>
           </a:p>
@@ -757,7 +759,7 @@
           <a:p>
             <a:fld id="{6CC5352D-349F-485B-9CFD-C06486738278}" type="datetimeFigureOut">
               <a:rPr lang="en-US" smtClean="0"/>
-              <a:t>2/6/2023</a:t>
+              <a:t>4/18/2023</a:t>
             </a:fld>
             <a:endParaRPr lang="en-US"/>
           </a:p>
@@ -1002,7 +1004,7 @@
           <a:p>
             <a:fld id="{6CC5352D-349F-485B-9CFD-C06486738278}" type="datetimeFigureOut">
               <a:rPr lang="en-US" smtClean="0"/>
-              <a:t>2/6/2023</a:t>
+              <a:t>4/18/2023</a:t>
             </a:fld>
             <a:endParaRPr lang="en-US"/>
           </a:p>
@@ -1231,7 +1233,7 @@
           <a:p>
             <a:fld id="{6CC5352D-349F-485B-9CFD-C06486738278}" type="datetimeFigureOut">
               <a:rPr lang="en-US" smtClean="0"/>
-              <a:t>2/6/2023</a:t>
+              <a:t>4/18/2023</a:t>
             </a:fld>
             <a:endParaRPr lang="en-US"/>
           </a:p>
@@ -1595,7 +1597,7 @@
           <a:p>
             <a:fld id="{6CC5352D-349F-485B-9CFD-C06486738278}" type="datetimeFigureOut">
               <a:rPr lang="en-US" smtClean="0"/>
-              <a:t>2/6/2023</a:t>
+              <a:t>4/18/2023</a:t>
             </a:fld>
             <a:endParaRPr lang="en-US"/>
           </a:p>
@@ -1712,7 +1714,7 @@
           <a:p>
             <a:fld id="{6CC5352D-349F-485B-9CFD-C06486738278}" type="datetimeFigureOut">
               <a:rPr lang="en-US" smtClean="0"/>
-              <a:t>2/6/2023</a:t>
+              <a:t>4/18/2023</a:t>
             </a:fld>
             <a:endParaRPr lang="en-US"/>
           </a:p>
@@ -1807,7 +1809,7 @@
           <a:p>
             <a:fld id="{6CC5352D-349F-485B-9CFD-C06486738278}" type="datetimeFigureOut">
               <a:rPr lang="en-US" smtClean="0"/>
-              <a:t>2/6/2023</a:t>
+              <a:t>4/18/2023</a:t>
             </a:fld>
             <a:endParaRPr lang="en-US"/>
           </a:p>
@@ -2082,7 +2084,7 @@
           <a:p>
             <a:fld id="{6CC5352D-349F-485B-9CFD-C06486738278}" type="datetimeFigureOut">
               <a:rPr lang="en-US" smtClean="0"/>
-              <a:t>2/6/2023</a:t>
+              <a:t>4/18/2023</a:t>
             </a:fld>
             <a:endParaRPr lang="en-US"/>
           </a:p>
@@ -2334,7 +2336,7 @@
           <a:p>
             <a:fld id="{6CC5352D-349F-485B-9CFD-C06486738278}" type="datetimeFigureOut">
               <a:rPr lang="en-US" smtClean="0"/>
-              <a:t>2/6/2023</a:t>
+              <a:t>4/18/2023</a:t>
             </a:fld>
             <a:endParaRPr lang="en-US"/>
           </a:p>
@@ -2545,7 +2547,7 @@
           <a:p>
             <a:fld id="{6CC5352D-349F-485B-9CFD-C06486738278}" type="datetimeFigureOut">
               <a:rPr lang="en-US" smtClean="0"/>
-              <a:t>2/6/2023</a:t>
+              <a:t>4/18/2023</a:t>
             </a:fld>
             <a:endParaRPr lang="en-US"/>
           </a:p>
@@ -11185,6 +11187,3803 @@
 </p:sld>
 </file>
 
+<file path=ppt/slides/slide4.xml><?xml version="1.0" encoding="utf-8"?>
+<p:sld xmlns:a="http://schemas.openxmlformats.org/drawingml/2006/main" xmlns:r="http://schemas.openxmlformats.org/officeDocument/2006/relationships" xmlns:p="http://schemas.openxmlformats.org/presentationml/2006/main">
+  <p:cSld>
+    <p:spTree>
+      <p:nvGrpSpPr>
+        <p:cNvPr id="1" name=""/>
+        <p:cNvGrpSpPr/>
+        <p:nvPr/>
+      </p:nvGrpSpPr>
+      <p:grpSpPr>
+        <a:xfrm>
+          <a:off x="0" y="0"/>
+          <a:ext cx="0" cy="0"/>
+          <a:chOff x="0" y="0"/>
+          <a:chExt cx="0" cy="0"/>
+        </a:xfrm>
+      </p:grpSpPr>
+      <p:sp>
+        <p:nvSpPr>
+          <p:cNvPr id="2" name="Title 1">
+            <a:extLst>
+              <a:ext uri="{FF2B5EF4-FFF2-40B4-BE49-F238E27FC236}">
+                <a16:creationId xmlns:a16="http://schemas.microsoft.com/office/drawing/2014/main" id="{93ED53F4-A069-47B7-2C54-42478148BF62}"/>
+              </a:ext>
+            </a:extLst>
+          </p:cNvPr>
+          <p:cNvSpPr>
+            <a:spLocks noGrp="1"/>
+          </p:cNvSpPr>
+          <p:nvPr>
+            <p:ph type="ctrTitle"/>
+          </p:nvPr>
+        </p:nvSpPr>
+        <p:spPr/>
+        <p:txBody>
+          <a:bodyPr>
+            <a:normAutofit fontScale="90000"/>
+          </a:bodyPr>
+          <a:lstStyle/>
+          <a:p>
+            <a:r>
+              <a:rPr lang="en-US" dirty="0"/>
+              <a:t>File format for storing network topology, surfaces, and volume</a:t>
+            </a:r>
+            <a:br>
+              <a:rPr lang="en-US" dirty="0"/>
+            </a:br>
+            <a:r>
+              <a:rPr lang="en-US" dirty="0"/>
+              <a:t>*.</a:t>
+            </a:r>
+            <a:r>
+              <a:rPr lang="en-US" dirty="0" err="1"/>
+              <a:t>nsvt</a:t>
+            </a:r>
+            <a:endParaRPr lang="en-US" dirty="0"/>
+          </a:p>
+        </p:txBody>
+      </p:sp>
+    </p:spTree>
+    <p:extLst>
+      <p:ext uri="{BB962C8B-B14F-4D97-AF65-F5344CB8AC3E}">
+        <p14:creationId xmlns:p14="http://schemas.microsoft.com/office/powerpoint/2010/main" val="835789376"/>
+      </p:ext>
+    </p:extLst>
+  </p:cSld>
+  <p:clrMapOvr>
+    <a:masterClrMapping/>
+  </p:clrMapOvr>
+</p:sld>
+</file>
+
+<file path=ppt/slides/slide5.xml><?xml version="1.0" encoding="utf-8"?>
+<p:sld xmlns:a="http://schemas.openxmlformats.org/drawingml/2006/main" xmlns:r="http://schemas.openxmlformats.org/officeDocument/2006/relationships" xmlns:p="http://schemas.openxmlformats.org/presentationml/2006/main">
+  <p:cSld>
+    <p:spTree>
+      <p:nvGrpSpPr>
+        <p:cNvPr id="1" name=""/>
+        <p:cNvGrpSpPr/>
+        <p:nvPr/>
+      </p:nvGrpSpPr>
+      <p:grpSpPr>
+        <a:xfrm>
+          <a:off x="0" y="0"/>
+          <a:ext cx="0" cy="0"/>
+          <a:chOff x="0" y="0"/>
+          <a:chExt cx="0" cy="0"/>
+        </a:xfrm>
+      </p:grpSpPr>
+      <p:sp>
+        <p:nvSpPr>
+          <p:cNvPr id="66" name="Rounded Rectangle 65"/>
+          <p:cNvSpPr/>
+          <p:nvPr/>
+        </p:nvSpPr>
+        <p:spPr>
+          <a:xfrm>
+            <a:off x="2877042" y="87086"/>
+            <a:ext cx="4161966" cy="6339840"/>
+          </a:xfrm>
+          <a:prstGeom prst="roundRect">
+            <a:avLst>
+              <a:gd name="adj" fmla="val 5054"/>
+            </a:avLst>
+          </a:prstGeom>
+          <a:noFill/>
+          <a:ln w="19050">
+            <a:solidFill>
+              <a:schemeClr val="tx2">
+                <a:lumMod val="40000"/>
+                <a:lumOff val="60000"/>
+              </a:schemeClr>
+            </a:solidFill>
+            <a:prstDash val="sysDash"/>
+          </a:ln>
+        </p:spPr>
+        <p:style>
+          <a:lnRef idx="2">
+            <a:schemeClr val="accent1">
+              <a:shade val="50000"/>
+            </a:schemeClr>
+          </a:lnRef>
+          <a:fillRef idx="1">
+            <a:schemeClr val="accent1"/>
+          </a:fillRef>
+          <a:effectRef idx="0">
+            <a:schemeClr val="accent1"/>
+          </a:effectRef>
+          <a:fontRef idx="minor">
+            <a:schemeClr val="lt1"/>
+          </a:fontRef>
+        </p:style>
+        <p:txBody>
+          <a:bodyPr rtlCol="0" anchor="ctr"/>
+          <a:lstStyle/>
+          <a:p>
+            <a:pPr algn="ctr"/>
+            <a:endParaRPr lang="en-US"/>
+          </a:p>
+        </p:txBody>
+      </p:sp>
+      <p:sp>
+        <p:nvSpPr>
+          <p:cNvPr id="72" name="Rounded Rectangle 71"/>
+          <p:cNvSpPr/>
+          <p:nvPr/>
+        </p:nvSpPr>
+        <p:spPr>
+          <a:xfrm>
+            <a:off x="7211060" y="87086"/>
+            <a:ext cx="3365500" cy="6339840"/>
+          </a:xfrm>
+          <a:prstGeom prst="roundRect">
+            <a:avLst>
+              <a:gd name="adj" fmla="val 5054"/>
+            </a:avLst>
+          </a:prstGeom>
+          <a:noFill/>
+          <a:ln w="19050">
+            <a:solidFill>
+              <a:schemeClr val="tx2">
+                <a:lumMod val="40000"/>
+                <a:lumOff val="60000"/>
+              </a:schemeClr>
+            </a:solidFill>
+            <a:prstDash val="sysDash"/>
+          </a:ln>
+        </p:spPr>
+        <p:style>
+          <a:lnRef idx="2">
+            <a:schemeClr val="accent1">
+              <a:shade val="50000"/>
+            </a:schemeClr>
+          </a:lnRef>
+          <a:fillRef idx="1">
+            <a:schemeClr val="accent1"/>
+          </a:fillRef>
+          <a:effectRef idx="0">
+            <a:schemeClr val="accent1"/>
+          </a:effectRef>
+          <a:fontRef idx="minor">
+            <a:schemeClr val="lt1"/>
+          </a:fontRef>
+        </p:style>
+        <p:txBody>
+          <a:bodyPr rtlCol="0" anchor="ctr"/>
+          <a:lstStyle/>
+          <a:p>
+            <a:pPr algn="ctr"/>
+            <a:endParaRPr lang="en-US"/>
+          </a:p>
+        </p:txBody>
+      </p:sp>
+      <p:sp>
+        <p:nvSpPr>
+          <p:cNvPr id="4" name="Rectangle 3"/>
+          <p:cNvSpPr/>
+          <p:nvPr/>
+        </p:nvSpPr>
+        <p:spPr>
+          <a:xfrm>
+            <a:off x="928806" y="534771"/>
+            <a:ext cx="1337360" cy="1736152"/>
+          </a:xfrm>
+          <a:prstGeom prst="rect">
+            <a:avLst/>
+          </a:prstGeom>
+          <a:solidFill>
+            <a:schemeClr val="accent1">
+              <a:lumMod val="60000"/>
+              <a:lumOff val="40000"/>
+            </a:schemeClr>
+          </a:solidFill>
+          <a:ln>
+            <a:solidFill>
+              <a:schemeClr val="accent1">
+                <a:lumMod val="50000"/>
+              </a:schemeClr>
+            </a:solidFill>
+          </a:ln>
+        </p:spPr>
+        <p:style>
+          <a:lnRef idx="2">
+            <a:schemeClr val="accent1">
+              <a:shade val="50000"/>
+            </a:schemeClr>
+          </a:lnRef>
+          <a:fillRef idx="1">
+            <a:schemeClr val="accent1"/>
+          </a:fillRef>
+          <a:effectRef idx="0">
+            <a:schemeClr val="accent1"/>
+          </a:effectRef>
+          <a:fontRef idx="minor">
+            <a:schemeClr val="lt1"/>
+          </a:fontRef>
+        </p:style>
+        <p:txBody>
+          <a:bodyPr rtlCol="0" anchor="ctr"/>
+          <a:lstStyle/>
+          <a:p>
+            <a:pPr algn="ctr"/>
+            <a:r>
+              <a:rPr lang="en-US" dirty="0">
+                <a:solidFill>
+                  <a:schemeClr val="tx1"/>
+                </a:solidFill>
+              </a:rPr>
+              <a:t>header</a:t>
+            </a:r>
+          </a:p>
+        </p:txBody>
+      </p:sp>
+      <p:sp>
+        <p:nvSpPr>
+          <p:cNvPr id="5" name="Rectangle 4"/>
+          <p:cNvSpPr/>
+          <p:nvPr/>
+        </p:nvSpPr>
+        <p:spPr>
+          <a:xfrm>
+            <a:off x="928806" y="2270923"/>
+            <a:ext cx="1337359" cy="3770389"/>
+          </a:xfrm>
+          <a:prstGeom prst="rect">
+            <a:avLst/>
+          </a:prstGeom>
+          <a:solidFill>
+            <a:schemeClr val="accent2">
+              <a:lumMod val="60000"/>
+              <a:lumOff val="40000"/>
+            </a:schemeClr>
+          </a:solidFill>
+          <a:ln>
+            <a:solidFill>
+              <a:schemeClr val="accent2">
+                <a:lumMod val="50000"/>
+              </a:schemeClr>
+            </a:solidFill>
+          </a:ln>
+        </p:spPr>
+        <p:style>
+          <a:lnRef idx="2">
+            <a:schemeClr val="accent1">
+              <a:shade val="50000"/>
+            </a:schemeClr>
+          </a:lnRef>
+          <a:fillRef idx="1">
+            <a:schemeClr val="accent1"/>
+          </a:fillRef>
+          <a:effectRef idx="0">
+            <a:schemeClr val="accent1"/>
+          </a:effectRef>
+          <a:fontRef idx="minor">
+            <a:schemeClr val="lt1"/>
+          </a:fontRef>
+        </p:style>
+        <p:txBody>
+          <a:bodyPr rtlCol="0" anchor="ctr"/>
+          <a:lstStyle/>
+          <a:p>
+            <a:pPr algn="ctr"/>
+            <a:r>
+              <a:rPr lang="en-US" dirty="0">
+                <a:solidFill>
+                  <a:schemeClr val="tx1"/>
+                </a:solidFill>
+              </a:rPr>
+              <a:t>binary</a:t>
+            </a:r>
+          </a:p>
+        </p:txBody>
+      </p:sp>
+      <p:sp>
+        <p:nvSpPr>
+          <p:cNvPr id="6" name="Left Brace 5"/>
+          <p:cNvSpPr/>
+          <p:nvPr/>
+        </p:nvSpPr>
+        <p:spPr>
+          <a:xfrm>
+            <a:off x="533224" y="534771"/>
+            <a:ext cx="395582" cy="1736152"/>
+          </a:xfrm>
+          <a:prstGeom prst="leftBrace">
+            <a:avLst/>
+          </a:prstGeom>
+          <a:ln w="12700">
+            <a:solidFill>
+              <a:schemeClr val="tx1"/>
+            </a:solidFill>
+          </a:ln>
+        </p:spPr>
+        <p:style>
+          <a:lnRef idx="1">
+            <a:schemeClr val="accent1"/>
+          </a:lnRef>
+          <a:fillRef idx="0">
+            <a:schemeClr val="accent1"/>
+          </a:fillRef>
+          <a:effectRef idx="0">
+            <a:schemeClr val="accent1"/>
+          </a:effectRef>
+          <a:fontRef idx="minor">
+            <a:schemeClr val="tx1"/>
+          </a:fontRef>
+        </p:style>
+        <p:txBody>
+          <a:bodyPr rtlCol="0" anchor="ctr"/>
+          <a:lstStyle/>
+          <a:p>
+            <a:pPr algn="ctr"/>
+            <a:endParaRPr lang="en-US"/>
+          </a:p>
+        </p:txBody>
+      </p:sp>
+      <p:sp>
+        <p:nvSpPr>
+          <p:cNvPr id="7" name="TextBox 6"/>
+          <p:cNvSpPr txBox="1"/>
+          <p:nvPr/>
+        </p:nvSpPr>
+        <p:spPr>
+          <a:xfrm>
+            <a:off x="-120693" y="1084442"/>
+            <a:ext cx="853159" cy="646331"/>
+          </a:xfrm>
+          <a:prstGeom prst="rect">
+            <a:avLst/>
+          </a:prstGeom>
+          <a:noFill/>
+        </p:spPr>
+        <p:txBody>
+          <a:bodyPr wrap="square" rtlCol="0">
+            <a:spAutoFit/>
+          </a:bodyPr>
+          <a:lstStyle/>
+          <a:p>
+            <a:pPr algn="ctr"/>
+            <a:r>
+              <a:rPr lang="en-US" dirty="0"/>
+              <a:t>80</a:t>
+            </a:r>
+          </a:p>
+          <a:p>
+            <a:pPr algn="ctr"/>
+            <a:r>
+              <a:rPr lang="en-US" dirty="0"/>
+              <a:t>bytes</a:t>
+            </a:r>
+          </a:p>
+        </p:txBody>
+      </p:sp>
+      <p:sp>
+        <p:nvSpPr>
+          <p:cNvPr id="8" name="Left Brace 7"/>
+          <p:cNvSpPr/>
+          <p:nvPr/>
+        </p:nvSpPr>
+        <p:spPr>
+          <a:xfrm>
+            <a:off x="533224" y="2270923"/>
+            <a:ext cx="395582" cy="3770390"/>
+          </a:xfrm>
+          <a:prstGeom prst="leftBrace">
+            <a:avLst/>
+          </a:prstGeom>
+          <a:ln w="12700">
+            <a:solidFill>
+              <a:schemeClr val="tx1"/>
+            </a:solidFill>
+          </a:ln>
+        </p:spPr>
+        <p:style>
+          <a:lnRef idx="1">
+            <a:schemeClr val="accent1"/>
+          </a:lnRef>
+          <a:fillRef idx="0">
+            <a:schemeClr val="accent1"/>
+          </a:fillRef>
+          <a:effectRef idx="0">
+            <a:schemeClr val="accent1"/>
+          </a:effectRef>
+          <a:fontRef idx="minor">
+            <a:schemeClr val="tx1"/>
+          </a:fontRef>
+        </p:style>
+        <p:txBody>
+          <a:bodyPr rtlCol="0" anchor="ctr"/>
+          <a:lstStyle/>
+          <a:p>
+            <a:pPr algn="ctr"/>
+            <a:endParaRPr lang="en-US"/>
+          </a:p>
+        </p:txBody>
+      </p:sp>
+      <p:sp>
+        <p:nvSpPr>
+          <p:cNvPr id="9" name="TextBox 8"/>
+          <p:cNvSpPr txBox="1"/>
+          <p:nvPr/>
+        </p:nvSpPr>
+        <p:spPr>
+          <a:xfrm>
+            <a:off x="-147592" y="3837712"/>
+            <a:ext cx="919646" cy="646331"/>
+          </a:xfrm>
+          <a:prstGeom prst="rect">
+            <a:avLst/>
+          </a:prstGeom>
+          <a:noFill/>
+        </p:spPr>
+        <p:txBody>
+          <a:bodyPr wrap="square" rtlCol="0">
+            <a:spAutoFit/>
+          </a:bodyPr>
+          <a:lstStyle/>
+          <a:p>
+            <a:pPr algn="ctr"/>
+            <a:r>
+              <a:rPr lang="en-US" dirty="0"/>
+              <a:t>N - 80</a:t>
+            </a:r>
+          </a:p>
+          <a:p>
+            <a:pPr algn="ctr"/>
+            <a:r>
+              <a:rPr lang="en-US" dirty="0"/>
+              <a:t>bytes</a:t>
+            </a:r>
+          </a:p>
+        </p:txBody>
+      </p:sp>
+      <p:sp>
+        <p:nvSpPr>
+          <p:cNvPr id="10" name="TextBox 9"/>
+          <p:cNvSpPr txBox="1"/>
+          <p:nvPr/>
+        </p:nvSpPr>
+        <p:spPr>
+          <a:xfrm>
+            <a:off x="445951" y="165438"/>
+            <a:ext cx="2178353" cy="369332"/>
+          </a:xfrm>
+          <a:prstGeom prst="rect">
+            <a:avLst/>
+          </a:prstGeom>
+          <a:noFill/>
+        </p:spPr>
+        <p:txBody>
+          <a:bodyPr wrap="none" rtlCol="0">
+            <a:spAutoFit/>
+          </a:bodyPr>
+          <a:lstStyle/>
+          <a:p>
+            <a:pPr algn="ctr"/>
+            <a:r>
+              <a:rPr lang="en-US" dirty="0"/>
+              <a:t>NETSVT file = N bytes</a:t>
+            </a:r>
+          </a:p>
+        </p:txBody>
+      </p:sp>
+      <p:grpSp>
+        <p:nvGrpSpPr>
+          <p:cNvPr id="19" name="Group 18"/>
+          <p:cNvGrpSpPr/>
+          <p:nvPr/>
+        </p:nvGrpSpPr>
+        <p:grpSpPr>
+          <a:xfrm>
+            <a:off x="3028967" y="539529"/>
+            <a:ext cx="2282855" cy="5506543"/>
+            <a:chOff x="3564951" y="547832"/>
+            <a:chExt cx="1881168" cy="4456817"/>
+          </a:xfrm>
+        </p:grpSpPr>
+        <p:sp>
+          <p:nvSpPr>
+            <p:cNvPr id="11" name="Rectangle 10"/>
+            <p:cNvSpPr/>
+            <p:nvPr/>
+          </p:nvSpPr>
+          <p:spPr>
+            <a:xfrm>
+              <a:off x="3564951" y="547832"/>
+              <a:ext cx="1881168" cy="780063"/>
+            </a:xfrm>
+            <a:prstGeom prst="rect">
+              <a:avLst/>
+            </a:prstGeom>
+            <a:solidFill>
+              <a:schemeClr val="accent6">
+                <a:lumMod val="40000"/>
+                <a:lumOff val="60000"/>
+              </a:schemeClr>
+            </a:solidFill>
+            <a:ln>
+              <a:solidFill>
+                <a:schemeClr val="accent6">
+                  <a:lumMod val="50000"/>
+                </a:schemeClr>
+              </a:solidFill>
+            </a:ln>
+          </p:spPr>
+          <p:style>
+            <a:lnRef idx="2">
+              <a:schemeClr val="accent1">
+                <a:shade val="50000"/>
+              </a:schemeClr>
+            </a:lnRef>
+            <a:fillRef idx="1">
+              <a:schemeClr val="accent1"/>
+            </a:fillRef>
+            <a:effectRef idx="0">
+              <a:schemeClr val="accent1"/>
+            </a:effectRef>
+            <a:fontRef idx="minor">
+              <a:schemeClr val="lt1"/>
+            </a:fontRef>
+          </p:style>
+          <p:txBody>
+            <a:bodyPr rtlCol="0" anchor="ctr"/>
+            <a:lstStyle/>
+            <a:p>
+              <a:pPr algn="ctr"/>
+              <a:r>
+                <a:rPr lang="en-US" dirty="0">
+                  <a:solidFill>
+                    <a:schemeClr val="tx1"/>
+                  </a:solidFill>
+                </a:rPr>
+                <a:t>identifier (ID)</a:t>
+              </a:r>
+            </a:p>
+            <a:p>
+              <a:pPr algn="ctr"/>
+              <a:r>
+                <a:rPr lang="en-US" dirty="0">
+                  <a:solidFill>
+                    <a:schemeClr val="tx1"/>
+                  </a:solidFill>
+                </a:rPr>
+                <a:t>14 bytes</a:t>
+              </a:r>
+            </a:p>
+            <a:p>
+              <a:pPr algn="ctr"/>
+              <a:r>
+                <a:rPr lang="en-US">
+                  <a:solidFill>
+                    <a:schemeClr val="tx1"/>
+                  </a:solidFill>
+                  <a:latin typeface="Consolas" panose="020B0609020204030204" pitchFamily="49" charset="0"/>
+                </a:rPr>
+                <a:t>“nsvt2”</a:t>
+              </a:r>
+              <a:endParaRPr lang="en-US" dirty="0">
+                <a:solidFill>
+                  <a:schemeClr val="tx1"/>
+                </a:solidFill>
+                <a:latin typeface="Consolas" panose="020B0609020204030204" pitchFamily="49" charset="0"/>
+              </a:endParaRPr>
+            </a:p>
+          </p:txBody>
+        </p:sp>
+        <p:sp>
+          <p:nvSpPr>
+            <p:cNvPr id="15" name="Rectangle 14"/>
+            <p:cNvSpPr/>
+            <p:nvPr/>
+          </p:nvSpPr>
+          <p:spPr>
+            <a:xfrm>
+              <a:off x="3564951" y="1327895"/>
+              <a:ext cx="1881168" cy="3231689"/>
+            </a:xfrm>
+            <a:prstGeom prst="rect">
+              <a:avLst/>
+            </a:prstGeom>
+            <a:solidFill>
+              <a:schemeClr val="accent5">
+                <a:lumMod val="40000"/>
+                <a:lumOff val="60000"/>
+              </a:schemeClr>
+            </a:solidFill>
+            <a:ln>
+              <a:solidFill>
+                <a:schemeClr val="accent5">
+                  <a:lumMod val="50000"/>
+                </a:schemeClr>
+              </a:solidFill>
+            </a:ln>
+          </p:spPr>
+          <p:style>
+            <a:lnRef idx="2">
+              <a:schemeClr val="accent1">
+                <a:shade val="50000"/>
+              </a:schemeClr>
+            </a:lnRef>
+            <a:fillRef idx="1">
+              <a:schemeClr val="accent1"/>
+            </a:fillRef>
+            <a:effectRef idx="0">
+              <a:schemeClr val="accent1"/>
+            </a:effectRef>
+            <a:fontRef idx="minor">
+              <a:schemeClr val="lt1"/>
+            </a:fontRef>
+          </p:style>
+          <p:txBody>
+            <a:bodyPr rtlCol="0" anchor="ctr"/>
+            <a:lstStyle/>
+            <a:p>
+              <a:pPr algn="ctr"/>
+              <a:r>
+                <a:rPr lang="en-US" dirty="0">
+                  <a:solidFill>
+                    <a:schemeClr val="tx1"/>
+                  </a:solidFill>
+                </a:rPr>
+                <a:t>description</a:t>
+              </a:r>
+            </a:p>
+            <a:p>
+              <a:pPr algn="ctr"/>
+              <a:r>
+                <a:rPr lang="en-US" dirty="0">
+                  <a:solidFill>
+                    <a:schemeClr val="tx1"/>
+                  </a:solidFill>
+                </a:rPr>
+                <a:t>58 bytes</a:t>
+              </a:r>
+            </a:p>
+          </p:txBody>
+        </p:sp>
+        <p:sp>
+          <p:nvSpPr>
+            <p:cNvPr id="17" name="Rectangle 16"/>
+            <p:cNvSpPr/>
+            <p:nvPr/>
+          </p:nvSpPr>
+          <p:spPr>
+            <a:xfrm>
+              <a:off x="3564951" y="4555048"/>
+              <a:ext cx="1881168" cy="222875"/>
+            </a:xfrm>
+            <a:prstGeom prst="rect">
+              <a:avLst/>
+            </a:prstGeom>
+            <a:solidFill>
+              <a:srgbClr val="C7A1E3"/>
+            </a:solidFill>
+            <a:ln>
+              <a:solidFill>
+                <a:srgbClr val="7030A0"/>
+              </a:solidFill>
+            </a:ln>
+          </p:spPr>
+          <p:style>
+            <a:lnRef idx="2">
+              <a:schemeClr val="accent1">
+                <a:shade val="50000"/>
+              </a:schemeClr>
+            </a:lnRef>
+            <a:fillRef idx="1">
+              <a:schemeClr val="accent1"/>
+            </a:fillRef>
+            <a:effectRef idx="0">
+              <a:schemeClr val="accent1"/>
+            </a:effectRef>
+            <a:fontRef idx="minor">
+              <a:schemeClr val="lt1"/>
+            </a:fontRef>
+          </p:style>
+          <p:txBody>
+            <a:bodyPr rtlCol="0" anchor="ctr"/>
+            <a:lstStyle/>
+            <a:p>
+              <a:pPr algn="ctr"/>
+              <a:r>
+                <a:rPr lang="en-US" dirty="0">
+                  <a:solidFill>
+                    <a:schemeClr val="tx1"/>
+                  </a:solidFill>
+                </a:rPr>
+                <a:t>#vertices 4 byte </a:t>
+              </a:r>
+              <a:r>
+                <a:rPr lang="en-US" dirty="0" err="1">
+                  <a:solidFill>
+                    <a:schemeClr val="tx1"/>
+                  </a:solidFill>
+                  <a:latin typeface="Consolas" panose="020B0609020204030204" pitchFamily="49" charset="0"/>
+                </a:rPr>
+                <a:t>uint</a:t>
+              </a:r>
+              <a:endParaRPr lang="en-US" dirty="0">
+                <a:solidFill>
+                  <a:schemeClr val="tx1"/>
+                </a:solidFill>
+                <a:latin typeface="Consolas" panose="020B0609020204030204" pitchFamily="49" charset="0"/>
+              </a:endParaRPr>
+            </a:p>
+          </p:txBody>
+        </p:sp>
+        <p:sp>
+          <p:nvSpPr>
+            <p:cNvPr id="18" name="Rectangle 17"/>
+            <p:cNvSpPr/>
+            <p:nvPr/>
+          </p:nvSpPr>
+          <p:spPr>
+            <a:xfrm>
+              <a:off x="3564951" y="4781774"/>
+              <a:ext cx="1881168" cy="222875"/>
+            </a:xfrm>
+            <a:prstGeom prst="rect">
+              <a:avLst/>
+            </a:prstGeom>
+            <a:solidFill>
+              <a:schemeClr val="accent4">
+                <a:lumMod val="40000"/>
+                <a:lumOff val="60000"/>
+              </a:schemeClr>
+            </a:solidFill>
+            <a:ln>
+              <a:solidFill>
+                <a:schemeClr val="accent4">
+                  <a:lumMod val="50000"/>
+                </a:schemeClr>
+              </a:solidFill>
+            </a:ln>
+          </p:spPr>
+          <p:style>
+            <a:lnRef idx="2">
+              <a:schemeClr val="accent1">
+                <a:shade val="50000"/>
+              </a:schemeClr>
+            </a:lnRef>
+            <a:fillRef idx="1">
+              <a:schemeClr val="accent1"/>
+            </a:fillRef>
+            <a:effectRef idx="0">
+              <a:schemeClr val="accent1"/>
+            </a:effectRef>
+            <a:fontRef idx="minor">
+              <a:schemeClr val="lt1"/>
+            </a:fontRef>
+          </p:style>
+          <p:txBody>
+            <a:bodyPr rtlCol="0" anchor="ctr"/>
+            <a:lstStyle/>
+            <a:p>
+              <a:pPr algn="ctr"/>
+              <a:r>
+                <a:rPr lang="en-US" dirty="0">
+                  <a:solidFill>
+                    <a:schemeClr val="tx1"/>
+                  </a:solidFill>
+                </a:rPr>
+                <a:t>#edges    4 byte </a:t>
+              </a:r>
+              <a:r>
+                <a:rPr lang="en-US" dirty="0" err="1">
+                  <a:solidFill>
+                    <a:schemeClr val="tx1"/>
+                  </a:solidFill>
+                  <a:latin typeface="Consolas" panose="020B0609020204030204" pitchFamily="49" charset="0"/>
+                </a:rPr>
+                <a:t>uint</a:t>
+              </a:r>
+              <a:endParaRPr lang="en-US" dirty="0">
+                <a:solidFill>
+                  <a:schemeClr val="tx1"/>
+                </a:solidFill>
+                <a:latin typeface="Consolas" panose="020B0609020204030204" pitchFamily="49" charset="0"/>
+              </a:endParaRPr>
+            </a:p>
+          </p:txBody>
+        </p:sp>
+      </p:grpSp>
+      <p:sp>
+        <p:nvSpPr>
+          <p:cNvPr id="20" name="TextBox 19"/>
+          <p:cNvSpPr txBox="1"/>
+          <p:nvPr/>
+        </p:nvSpPr>
+        <p:spPr>
+          <a:xfrm>
+            <a:off x="3745437" y="165438"/>
+            <a:ext cx="849913" cy="369332"/>
+          </a:xfrm>
+          <a:prstGeom prst="rect">
+            <a:avLst/>
+          </a:prstGeom>
+          <a:noFill/>
+        </p:spPr>
+        <p:txBody>
+          <a:bodyPr wrap="none" rtlCol="0">
+            <a:spAutoFit/>
+          </a:bodyPr>
+          <a:lstStyle/>
+          <a:p>
+            <a:pPr algn="ctr"/>
+            <a:r>
+              <a:rPr lang="en-US" dirty="0"/>
+              <a:t>header</a:t>
+            </a:r>
+          </a:p>
+        </p:txBody>
+      </p:sp>
+      <p:sp>
+        <p:nvSpPr>
+          <p:cNvPr id="22" name="Rectangle 21"/>
+          <p:cNvSpPr/>
+          <p:nvPr/>
+        </p:nvSpPr>
+        <p:spPr>
+          <a:xfrm>
+            <a:off x="5520101" y="534770"/>
+            <a:ext cx="1337360" cy="2548471"/>
+          </a:xfrm>
+          <a:prstGeom prst="rect">
+            <a:avLst/>
+          </a:prstGeom>
+          <a:solidFill>
+            <a:schemeClr val="accent1">
+              <a:lumMod val="60000"/>
+              <a:lumOff val="40000"/>
+            </a:schemeClr>
+          </a:solidFill>
+          <a:ln>
+            <a:solidFill>
+              <a:schemeClr val="accent1">
+                <a:lumMod val="50000"/>
+              </a:schemeClr>
+            </a:solidFill>
+          </a:ln>
+        </p:spPr>
+        <p:style>
+          <a:lnRef idx="2">
+            <a:schemeClr val="accent1">
+              <a:shade val="50000"/>
+            </a:schemeClr>
+          </a:lnRef>
+          <a:fillRef idx="1">
+            <a:schemeClr val="accent1"/>
+          </a:fillRef>
+          <a:effectRef idx="0">
+            <a:schemeClr val="accent1"/>
+          </a:effectRef>
+          <a:fontRef idx="minor">
+            <a:schemeClr val="lt1"/>
+          </a:fontRef>
+        </p:style>
+        <p:txBody>
+          <a:bodyPr rtlCol="0" anchor="ctr"/>
+          <a:lstStyle/>
+          <a:p>
+            <a:pPr algn="ctr"/>
+            <a:r>
+              <a:rPr lang="en-US" dirty="0">
+                <a:solidFill>
+                  <a:schemeClr val="tx1"/>
+                </a:solidFill>
+              </a:rPr>
+              <a:t>vertices</a:t>
+            </a:r>
+          </a:p>
+        </p:txBody>
+      </p:sp>
+      <p:sp>
+        <p:nvSpPr>
+          <p:cNvPr id="23" name="Rectangle 22"/>
+          <p:cNvSpPr/>
+          <p:nvPr/>
+        </p:nvSpPr>
+        <p:spPr>
+          <a:xfrm>
+            <a:off x="5520101" y="3083241"/>
+            <a:ext cx="1337359" cy="2958071"/>
+          </a:xfrm>
+          <a:prstGeom prst="rect">
+            <a:avLst/>
+          </a:prstGeom>
+          <a:solidFill>
+            <a:schemeClr val="accent2">
+              <a:lumMod val="60000"/>
+              <a:lumOff val="40000"/>
+            </a:schemeClr>
+          </a:solidFill>
+          <a:ln>
+            <a:solidFill>
+              <a:schemeClr val="accent2">
+                <a:lumMod val="50000"/>
+              </a:schemeClr>
+            </a:solidFill>
+          </a:ln>
+        </p:spPr>
+        <p:style>
+          <a:lnRef idx="2">
+            <a:schemeClr val="accent1">
+              <a:shade val="50000"/>
+            </a:schemeClr>
+          </a:lnRef>
+          <a:fillRef idx="1">
+            <a:schemeClr val="accent1"/>
+          </a:fillRef>
+          <a:effectRef idx="0">
+            <a:schemeClr val="accent1"/>
+          </a:effectRef>
+          <a:fontRef idx="minor">
+            <a:schemeClr val="lt1"/>
+          </a:fontRef>
+        </p:style>
+        <p:txBody>
+          <a:bodyPr rtlCol="0" anchor="ctr"/>
+          <a:lstStyle/>
+          <a:p>
+            <a:pPr algn="ctr"/>
+            <a:r>
+              <a:rPr lang="en-US" dirty="0">
+                <a:solidFill>
+                  <a:schemeClr val="tx1"/>
+                </a:solidFill>
+              </a:rPr>
+              <a:t>edges</a:t>
+            </a:r>
+          </a:p>
+        </p:txBody>
+      </p:sp>
+      <mc:AlternateContent xmlns:mc="http://schemas.openxmlformats.org/markup-compatibility/2006" xmlns:a14="http://schemas.microsoft.com/office/drawing/2010/main">
+        <mc:Choice Requires="a14">
+          <p:sp>
+            <p:nvSpPr>
+              <p:cNvPr id="25" name="Rectangle 24"/>
+              <p:cNvSpPr/>
+              <p:nvPr/>
+            </p:nvSpPr>
+            <p:spPr>
+              <a:xfrm>
+                <a:off x="5520101" y="852635"/>
+                <a:ext cx="1337359" cy="231807"/>
+              </a:xfrm>
+              <a:prstGeom prst="rect">
+                <a:avLst/>
+              </a:prstGeom>
+              <a:solidFill>
+                <a:schemeClr val="accent1">
+                  <a:lumMod val="20000"/>
+                  <a:lumOff val="80000"/>
+                </a:schemeClr>
+              </a:solidFill>
+              <a:ln>
+                <a:solidFill>
+                  <a:schemeClr val="tx1"/>
+                </a:solidFill>
+                <a:prstDash val="sysDash"/>
+              </a:ln>
+            </p:spPr>
+            <p:style>
+              <a:lnRef idx="2">
+                <a:schemeClr val="accent1">
+                  <a:shade val="50000"/>
+                </a:schemeClr>
+              </a:lnRef>
+              <a:fillRef idx="1">
+                <a:schemeClr val="accent1"/>
+              </a:fillRef>
+              <a:effectRef idx="0">
+                <a:schemeClr val="accent1"/>
+              </a:effectRef>
+              <a:fontRef idx="minor">
+                <a:schemeClr val="lt1"/>
+              </a:fontRef>
+            </p:style>
+            <p:txBody>
+              <a:bodyPr rtlCol="0" anchor="ctr"/>
+              <a:lstStyle/>
+              <a:p>
+                <a:pPr algn="ctr"/>
+                <a14:m>
+                  <m:oMathPara xmlns:m="http://schemas.openxmlformats.org/officeDocument/2006/math">
+                    <m:oMathParaPr>
+                      <m:jc m:val="centerGroup"/>
+                    </m:oMathParaPr>
+                    <m:oMath xmlns:m="http://schemas.openxmlformats.org/officeDocument/2006/math">
+                      <m:sSub>
+                        <m:sSubPr>
+                          <m:ctrlPr>
+                            <a:rPr lang="en-US" b="0" i="1" smtClean="0">
+                              <a:solidFill>
+                                <a:schemeClr val="tx1"/>
+                              </a:solidFill>
+                              <a:latin typeface="Cambria Math" panose="02040503050406030204" pitchFamily="18" charset="0"/>
+                            </a:rPr>
+                          </m:ctrlPr>
+                        </m:sSubPr>
+                        <m:e>
+                          <m:r>
+                            <a:rPr lang="en-US" b="0" i="1" smtClean="0">
+                              <a:solidFill>
+                                <a:schemeClr val="tx1"/>
+                              </a:solidFill>
+                              <a:latin typeface="Cambria Math" panose="02040503050406030204" pitchFamily="18" charset="0"/>
+                            </a:rPr>
+                            <m:t>𝑣</m:t>
+                          </m:r>
+                        </m:e>
+                        <m:sub>
+                          <m:r>
+                            <a:rPr lang="en-US" b="0" i="1" smtClean="0">
+                              <a:solidFill>
+                                <a:schemeClr val="tx1"/>
+                              </a:solidFill>
+                              <a:latin typeface="Cambria Math" panose="02040503050406030204" pitchFamily="18" charset="0"/>
+                            </a:rPr>
+                            <m:t>𝑖</m:t>
+                          </m:r>
+                        </m:sub>
+                      </m:sSub>
+                    </m:oMath>
+                  </m:oMathPara>
+                </a14:m>
+                <a:endParaRPr lang="en-US" dirty="0">
+                  <a:solidFill>
+                    <a:schemeClr val="tx1"/>
+                  </a:solidFill>
+                </a:endParaRPr>
+              </a:p>
+            </p:txBody>
+          </p:sp>
+        </mc:Choice>
+        <mc:Fallback xmlns="">
+          <p:sp>
+            <p:nvSpPr>
+              <p:cNvPr id="25" name="Rectangle 24"/>
+              <p:cNvSpPr>
+                <a:spLocks noRot="1" noChangeAspect="1" noMove="1" noResize="1" noEditPoints="1" noAdjustHandles="1" noChangeArrowheads="1" noChangeShapeType="1" noTextEdit="1"/>
+              </p:cNvSpPr>
+              <p:nvPr/>
+            </p:nvSpPr>
+            <p:spPr>
+              <a:xfrm>
+                <a:off x="5520101" y="852635"/>
+                <a:ext cx="1337359" cy="231807"/>
+              </a:xfrm>
+              <a:prstGeom prst="rect">
+                <a:avLst/>
+              </a:prstGeom>
+              <a:blipFill>
+                <a:blip r:embed="rId2"/>
+                <a:stretch>
+                  <a:fillRect b="-27500"/>
+                </a:stretch>
+              </a:blipFill>
+              <a:ln>
+                <a:solidFill>
+                  <a:schemeClr val="tx1"/>
+                </a:solidFill>
+                <a:prstDash val="sysDash"/>
+              </a:ln>
+            </p:spPr>
+            <p:txBody>
+              <a:bodyPr/>
+              <a:lstStyle/>
+              <a:p>
+                <a:r>
+                  <a:rPr lang="en-US">
+                    <a:noFill/>
+                  </a:rPr>
+                  <a:t> </a:t>
+                </a:r>
+              </a:p>
+            </p:txBody>
+          </p:sp>
+        </mc:Fallback>
+      </mc:AlternateContent>
+      <mc:AlternateContent xmlns:mc="http://schemas.openxmlformats.org/markup-compatibility/2006" xmlns:a14="http://schemas.microsoft.com/office/drawing/2010/main">
+        <mc:Choice Requires="a14">
+          <p:sp>
+            <p:nvSpPr>
+              <p:cNvPr id="26" name="Rectangle 25"/>
+              <p:cNvSpPr/>
+              <p:nvPr/>
+            </p:nvSpPr>
+            <p:spPr>
+              <a:xfrm>
+                <a:off x="5520101" y="3499751"/>
+                <a:ext cx="1337359" cy="231808"/>
+              </a:xfrm>
+              <a:prstGeom prst="rect">
+                <a:avLst/>
+              </a:prstGeom>
+              <a:solidFill>
+                <a:schemeClr val="accent2">
+                  <a:lumMod val="20000"/>
+                  <a:lumOff val="80000"/>
+                </a:schemeClr>
+              </a:solidFill>
+              <a:ln>
+                <a:solidFill>
+                  <a:schemeClr val="tx1"/>
+                </a:solidFill>
+                <a:prstDash val="sysDash"/>
+              </a:ln>
+            </p:spPr>
+            <p:style>
+              <a:lnRef idx="2">
+                <a:schemeClr val="accent1">
+                  <a:shade val="50000"/>
+                </a:schemeClr>
+              </a:lnRef>
+              <a:fillRef idx="1">
+                <a:schemeClr val="accent1"/>
+              </a:fillRef>
+              <a:effectRef idx="0">
+                <a:schemeClr val="accent1"/>
+              </a:effectRef>
+              <a:fontRef idx="minor">
+                <a:schemeClr val="lt1"/>
+              </a:fontRef>
+            </p:style>
+            <p:txBody>
+              <a:bodyPr rtlCol="0" anchor="ctr"/>
+              <a:lstStyle/>
+              <a:p>
+                <a:pPr algn="ctr"/>
+                <a14:m>
+                  <m:oMathPara xmlns:m="http://schemas.openxmlformats.org/officeDocument/2006/math">
+                    <m:oMathParaPr>
+                      <m:jc m:val="centerGroup"/>
+                    </m:oMathParaPr>
+                    <m:oMath xmlns:m="http://schemas.openxmlformats.org/officeDocument/2006/math">
+                      <m:sSub>
+                        <m:sSubPr>
+                          <m:ctrlPr>
+                            <a:rPr lang="en-US" b="0" i="1" smtClean="0">
+                              <a:solidFill>
+                                <a:schemeClr val="tx1"/>
+                              </a:solidFill>
+                              <a:latin typeface="Cambria Math" panose="02040503050406030204" pitchFamily="18" charset="0"/>
+                            </a:rPr>
+                          </m:ctrlPr>
+                        </m:sSubPr>
+                        <m:e>
+                          <m:r>
+                            <a:rPr lang="en-US" b="0" i="1" smtClean="0">
+                              <a:solidFill>
+                                <a:schemeClr val="tx1"/>
+                              </a:solidFill>
+                              <a:latin typeface="Cambria Math" panose="02040503050406030204" pitchFamily="18" charset="0"/>
+                            </a:rPr>
+                            <m:t>𝑒</m:t>
+                          </m:r>
+                        </m:e>
+                        <m:sub>
+                          <m:r>
+                            <a:rPr lang="en-US" b="0" i="1" smtClean="0">
+                              <a:solidFill>
+                                <a:schemeClr val="tx1"/>
+                              </a:solidFill>
+                              <a:latin typeface="Cambria Math" panose="02040503050406030204" pitchFamily="18" charset="0"/>
+                            </a:rPr>
+                            <m:t>𝑖</m:t>
+                          </m:r>
+                        </m:sub>
+                      </m:sSub>
+                    </m:oMath>
+                  </m:oMathPara>
+                </a14:m>
+                <a:endParaRPr lang="en-US" dirty="0">
+                  <a:solidFill>
+                    <a:schemeClr val="tx1"/>
+                  </a:solidFill>
+                </a:endParaRPr>
+              </a:p>
+            </p:txBody>
+          </p:sp>
+        </mc:Choice>
+        <mc:Fallback xmlns="">
+          <p:sp>
+            <p:nvSpPr>
+              <p:cNvPr id="26" name="Rectangle 25"/>
+              <p:cNvSpPr>
+                <a:spLocks noRot="1" noChangeAspect="1" noMove="1" noResize="1" noEditPoints="1" noAdjustHandles="1" noChangeArrowheads="1" noChangeShapeType="1" noTextEdit="1"/>
+              </p:cNvSpPr>
+              <p:nvPr/>
+            </p:nvSpPr>
+            <p:spPr>
+              <a:xfrm>
+                <a:off x="5520101" y="3499751"/>
+                <a:ext cx="1337359" cy="231808"/>
+              </a:xfrm>
+              <a:prstGeom prst="rect">
+                <a:avLst/>
+              </a:prstGeom>
+              <a:blipFill>
+                <a:blip r:embed="rId3"/>
+                <a:stretch>
+                  <a:fillRect b="-27500"/>
+                </a:stretch>
+              </a:blipFill>
+              <a:ln>
+                <a:solidFill>
+                  <a:schemeClr val="tx1"/>
+                </a:solidFill>
+                <a:prstDash val="sysDash"/>
+              </a:ln>
+            </p:spPr>
+            <p:txBody>
+              <a:bodyPr/>
+              <a:lstStyle/>
+              <a:p>
+                <a:r>
+                  <a:rPr lang="en-US">
+                    <a:noFill/>
+                  </a:rPr>
+                  <a:t> </a:t>
+                </a:r>
+              </a:p>
+            </p:txBody>
+          </p:sp>
+        </mc:Fallback>
+      </mc:AlternateContent>
+      <mc:AlternateContent xmlns:mc="http://schemas.openxmlformats.org/markup-compatibility/2006" xmlns:a14="http://schemas.microsoft.com/office/drawing/2010/main">
+        <mc:Choice Requires="a14">
+          <p:sp>
+            <p:nvSpPr>
+              <p:cNvPr id="27" name="Rectangle 26"/>
+              <p:cNvSpPr/>
+              <p:nvPr/>
+            </p:nvSpPr>
+            <p:spPr>
+              <a:xfrm>
+                <a:off x="7368753" y="534770"/>
+                <a:ext cx="1337359" cy="349978"/>
+              </a:xfrm>
+              <a:prstGeom prst="rect">
+                <a:avLst/>
+              </a:prstGeom>
+              <a:solidFill>
+                <a:schemeClr val="accent6">
+                  <a:lumMod val="20000"/>
+                  <a:lumOff val="80000"/>
+                </a:schemeClr>
+              </a:solidFill>
+              <a:ln>
+                <a:solidFill>
+                  <a:schemeClr val="accent6">
+                    <a:lumMod val="50000"/>
+                  </a:schemeClr>
+                </a:solidFill>
+                <a:prstDash val="solid"/>
+              </a:ln>
+            </p:spPr>
+            <p:style>
+              <a:lnRef idx="2">
+                <a:schemeClr val="accent1">
+                  <a:shade val="50000"/>
+                </a:schemeClr>
+              </a:lnRef>
+              <a:fillRef idx="1">
+                <a:schemeClr val="accent1"/>
+              </a:fillRef>
+              <a:effectRef idx="0">
+                <a:schemeClr val="accent1"/>
+              </a:effectRef>
+              <a:fontRef idx="minor">
+                <a:schemeClr val="lt1"/>
+              </a:fontRef>
+            </p:style>
+            <p:txBody>
+              <a:bodyPr rtlCol="0" anchor="ctr"/>
+              <a:lstStyle/>
+              <a:p>
+                <a:pPr algn="ctr"/>
+                <a14:m>
+                  <m:oMath xmlns:m="http://schemas.openxmlformats.org/officeDocument/2006/math">
+                    <m:r>
+                      <a:rPr lang="en-US" b="0" i="1" smtClean="0">
+                        <a:solidFill>
+                          <a:schemeClr val="tx1"/>
+                        </a:solidFill>
+                        <a:latin typeface="Cambria Math" panose="02040503050406030204" pitchFamily="18" charset="0"/>
+                      </a:rPr>
+                      <m:t>𝑥</m:t>
+                    </m:r>
+                  </m:oMath>
+                </a14:m>
+                <a:r>
+                  <a:rPr lang="en-US" dirty="0">
+                    <a:solidFill>
+                      <a:schemeClr val="tx1"/>
+                    </a:solidFill>
+                  </a:rPr>
+                  <a:t> </a:t>
+                </a:r>
+                <a:r>
+                  <a:rPr lang="en-US" dirty="0">
+                    <a:solidFill>
+                      <a:schemeClr val="tx1"/>
+                    </a:solidFill>
+                    <a:latin typeface="Consolas" panose="020B0609020204030204" pitchFamily="49" charset="0"/>
+                  </a:rPr>
+                  <a:t>float</a:t>
+                </a:r>
+              </a:p>
+            </p:txBody>
+          </p:sp>
+        </mc:Choice>
+        <mc:Fallback xmlns="">
+          <p:sp>
+            <p:nvSpPr>
+              <p:cNvPr id="27" name="Rectangle 26"/>
+              <p:cNvSpPr>
+                <a:spLocks noRot="1" noChangeAspect="1" noMove="1" noResize="1" noEditPoints="1" noAdjustHandles="1" noChangeArrowheads="1" noChangeShapeType="1" noTextEdit="1"/>
+              </p:cNvSpPr>
+              <p:nvPr/>
+            </p:nvSpPr>
+            <p:spPr>
+              <a:xfrm>
+                <a:off x="7368753" y="534770"/>
+                <a:ext cx="1337359" cy="349978"/>
+              </a:xfrm>
+              <a:prstGeom prst="rect">
+                <a:avLst/>
+              </a:prstGeom>
+              <a:blipFill>
+                <a:blip r:embed="rId4"/>
+                <a:stretch>
+                  <a:fillRect t="-10169" b="-27119"/>
+                </a:stretch>
+              </a:blipFill>
+              <a:ln>
+                <a:solidFill>
+                  <a:schemeClr val="accent6">
+                    <a:lumMod val="50000"/>
+                  </a:schemeClr>
+                </a:solidFill>
+                <a:prstDash val="solid"/>
+              </a:ln>
+            </p:spPr>
+            <p:txBody>
+              <a:bodyPr/>
+              <a:lstStyle/>
+              <a:p>
+                <a:r>
+                  <a:rPr lang="en-US">
+                    <a:noFill/>
+                  </a:rPr>
+                  <a:t> </a:t>
+                </a:r>
+              </a:p>
+            </p:txBody>
+          </p:sp>
+        </mc:Fallback>
+      </mc:AlternateContent>
+      <mc:AlternateContent xmlns:mc="http://schemas.openxmlformats.org/markup-compatibility/2006" xmlns:a14="http://schemas.microsoft.com/office/drawing/2010/main">
+        <mc:Choice Requires="a14">
+          <p:sp>
+            <p:nvSpPr>
+              <p:cNvPr id="28" name="Rectangle 27"/>
+              <p:cNvSpPr/>
+              <p:nvPr/>
+            </p:nvSpPr>
+            <p:spPr>
+              <a:xfrm>
+                <a:off x="7368752" y="884748"/>
+                <a:ext cx="1337359" cy="349978"/>
+              </a:xfrm>
+              <a:prstGeom prst="rect">
+                <a:avLst/>
+              </a:prstGeom>
+              <a:solidFill>
+                <a:schemeClr val="accent6">
+                  <a:lumMod val="20000"/>
+                  <a:lumOff val="80000"/>
+                </a:schemeClr>
+              </a:solidFill>
+              <a:ln>
+                <a:solidFill>
+                  <a:schemeClr val="accent6">
+                    <a:lumMod val="50000"/>
+                  </a:schemeClr>
+                </a:solidFill>
+                <a:prstDash val="solid"/>
+              </a:ln>
+            </p:spPr>
+            <p:style>
+              <a:lnRef idx="2">
+                <a:schemeClr val="accent1">
+                  <a:shade val="50000"/>
+                </a:schemeClr>
+              </a:lnRef>
+              <a:fillRef idx="1">
+                <a:schemeClr val="accent1"/>
+              </a:fillRef>
+              <a:effectRef idx="0">
+                <a:schemeClr val="accent1"/>
+              </a:effectRef>
+              <a:fontRef idx="minor">
+                <a:schemeClr val="lt1"/>
+              </a:fontRef>
+            </p:style>
+            <p:txBody>
+              <a:bodyPr rtlCol="0" anchor="ctr"/>
+              <a:lstStyle/>
+              <a:p>
+                <a:pPr algn="ctr"/>
+                <a14:m>
+                  <m:oMath xmlns:m="http://schemas.openxmlformats.org/officeDocument/2006/math">
+                    <m:r>
+                      <a:rPr lang="en-US" b="0" i="1" smtClean="0">
+                        <a:solidFill>
+                          <a:schemeClr val="tx1"/>
+                        </a:solidFill>
+                        <a:latin typeface="Cambria Math" panose="02040503050406030204" pitchFamily="18" charset="0"/>
+                      </a:rPr>
+                      <m:t>𝑦</m:t>
+                    </m:r>
+                  </m:oMath>
+                </a14:m>
+                <a:r>
+                  <a:rPr lang="en-US" dirty="0">
+                    <a:solidFill>
+                      <a:schemeClr val="tx1"/>
+                    </a:solidFill>
+                  </a:rPr>
+                  <a:t> </a:t>
+                </a:r>
+                <a:r>
+                  <a:rPr lang="en-US" dirty="0">
+                    <a:solidFill>
+                      <a:schemeClr val="tx1"/>
+                    </a:solidFill>
+                    <a:latin typeface="Consolas" panose="020B0609020204030204" pitchFamily="49" charset="0"/>
+                  </a:rPr>
+                  <a:t>float</a:t>
+                </a:r>
+                <a:endParaRPr lang="en-US" dirty="0">
+                  <a:solidFill>
+                    <a:schemeClr val="tx1"/>
+                  </a:solidFill>
+                </a:endParaRPr>
+              </a:p>
+            </p:txBody>
+          </p:sp>
+        </mc:Choice>
+        <mc:Fallback xmlns="">
+          <p:sp>
+            <p:nvSpPr>
+              <p:cNvPr id="28" name="Rectangle 27"/>
+              <p:cNvSpPr>
+                <a:spLocks noRot="1" noChangeAspect="1" noMove="1" noResize="1" noEditPoints="1" noAdjustHandles="1" noChangeArrowheads="1" noChangeShapeType="1" noTextEdit="1"/>
+              </p:cNvSpPr>
+              <p:nvPr/>
+            </p:nvSpPr>
+            <p:spPr>
+              <a:xfrm>
+                <a:off x="7368752" y="884748"/>
+                <a:ext cx="1337359" cy="349978"/>
+              </a:xfrm>
+              <a:prstGeom prst="rect">
+                <a:avLst/>
+              </a:prstGeom>
+              <a:blipFill>
+                <a:blip r:embed="rId5"/>
+                <a:stretch>
+                  <a:fillRect t="-10000" b="-26667"/>
+                </a:stretch>
+              </a:blipFill>
+              <a:ln>
+                <a:solidFill>
+                  <a:schemeClr val="accent6">
+                    <a:lumMod val="50000"/>
+                  </a:schemeClr>
+                </a:solidFill>
+                <a:prstDash val="solid"/>
+              </a:ln>
+            </p:spPr>
+            <p:txBody>
+              <a:bodyPr/>
+              <a:lstStyle/>
+              <a:p>
+                <a:r>
+                  <a:rPr lang="en-US">
+                    <a:noFill/>
+                  </a:rPr>
+                  <a:t> </a:t>
+                </a:r>
+              </a:p>
+            </p:txBody>
+          </p:sp>
+        </mc:Fallback>
+      </mc:AlternateContent>
+      <mc:AlternateContent xmlns:mc="http://schemas.openxmlformats.org/markup-compatibility/2006" xmlns:a14="http://schemas.microsoft.com/office/drawing/2010/main">
+        <mc:Choice Requires="a14">
+          <p:sp>
+            <p:nvSpPr>
+              <p:cNvPr id="29" name="Rectangle 28"/>
+              <p:cNvSpPr/>
+              <p:nvPr/>
+            </p:nvSpPr>
+            <p:spPr>
+              <a:xfrm>
+                <a:off x="7368751" y="1234727"/>
+                <a:ext cx="1337359" cy="349978"/>
+              </a:xfrm>
+              <a:prstGeom prst="rect">
+                <a:avLst/>
+              </a:prstGeom>
+              <a:solidFill>
+                <a:schemeClr val="accent6">
+                  <a:lumMod val="20000"/>
+                  <a:lumOff val="80000"/>
+                </a:schemeClr>
+              </a:solidFill>
+              <a:ln>
+                <a:solidFill>
+                  <a:schemeClr val="accent6">
+                    <a:lumMod val="50000"/>
+                  </a:schemeClr>
+                </a:solidFill>
+                <a:prstDash val="solid"/>
+              </a:ln>
+            </p:spPr>
+            <p:style>
+              <a:lnRef idx="2">
+                <a:schemeClr val="accent1">
+                  <a:shade val="50000"/>
+                </a:schemeClr>
+              </a:lnRef>
+              <a:fillRef idx="1">
+                <a:schemeClr val="accent1"/>
+              </a:fillRef>
+              <a:effectRef idx="0">
+                <a:schemeClr val="accent1"/>
+              </a:effectRef>
+              <a:fontRef idx="minor">
+                <a:schemeClr val="lt1"/>
+              </a:fontRef>
+            </p:style>
+            <p:txBody>
+              <a:bodyPr rtlCol="0" anchor="ctr"/>
+              <a:lstStyle/>
+              <a:p>
+                <a:pPr algn="ctr"/>
+                <a14:m>
+                  <m:oMath xmlns:m="http://schemas.openxmlformats.org/officeDocument/2006/math">
+                    <m:r>
+                      <a:rPr lang="en-US" b="0" i="1" smtClean="0">
+                        <a:solidFill>
+                          <a:schemeClr val="tx1"/>
+                        </a:solidFill>
+                        <a:latin typeface="Cambria Math" panose="02040503050406030204" pitchFamily="18" charset="0"/>
+                      </a:rPr>
+                      <m:t>𝑧</m:t>
+                    </m:r>
+                  </m:oMath>
+                </a14:m>
+                <a:r>
+                  <a:rPr lang="en-US" dirty="0">
+                    <a:solidFill>
+                      <a:schemeClr val="tx1"/>
+                    </a:solidFill>
+                  </a:rPr>
+                  <a:t> </a:t>
+                </a:r>
+                <a:r>
+                  <a:rPr lang="en-US" dirty="0">
+                    <a:solidFill>
+                      <a:schemeClr val="tx1"/>
+                    </a:solidFill>
+                    <a:latin typeface="Consolas" panose="020B0609020204030204" pitchFamily="49" charset="0"/>
+                  </a:rPr>
+                  <a:t>float</a:t>
+                </a:r>
+                <a:endParaRPr lang="en-US" dirty="0">
+                  <a:solidFill>
+                    <a:schemeClr val="tx1"/>
+                  </a:solidFill>
+                </a:endParaRPr>
+              </a:p>
+            </p:txBody>
+          </p:sp>
+        </mc:Choice>
+        <mc:Fallback xmlns="">
+          <p:sp>
+            <p:nvSpPr>
+              <p:cNvPr id="29" name="Rectangle 28"/>
+              <p:cNvSpPr>
+                <a:spLocks noRot="1" noChangeAspect="1" noMove="1" noResize="1" noEditPoints="1" noAdjustHandles="1" noChangeArrowheads="1" noChangeShapeType="1" noTextEdit="1"/>
+              </p:cNvSpPr>
+              <p:nvPr/>
+            </p:nvSpPr>
+            <p:spPr>
+              <a:xfrm>
+                <a:off x="7368751" y="1234727"/>
+                <a:ext cx="1337359" cy="349978"/>
+              </a:xfrm>
+              <a:prstGeom prst="rect">
+                <a:avLst/>
+              </a:prstGeom>
+              <a:blipFill>
+                <a:blip r:embed="rId6"/>
+                <a:stretch>
+                  <a:fillRect t="-10169" b="-27119"/>
+                </a:stretch>
+              </a:blipFill>
+              <a:ln>
+                <a:solidFill>
+                  <a:schemeClr val="accent6">
+                    <a:lumMod val="50000"/>
+                  </a:schemeClr>
+                </a:solidFill>
+                <a:prstDash val="solid"/>
+              </a:ln>
+            </p:spPr>
+            <p:txBody>
+              <a:bodyPr/>
+              <a:lstStyle/>
+              <a:p>
+                <a:r>
+                  <a:rPr lang="en-US">
+                    <a:noFill/>
+                  </a:rPr>
+                  <a:t> </a:t>
+                </a:r>
+              </a:p>
+            </p:txBody>
+          </p:sp>
+        </mc:Fallback>
+      </mc:AlternateContent>
+      <mc:AlternateContent xmlns:mc="http://schemas.openxmlformats.org/markup-compatibility/2006" xmlns:a14="http://schemas.microsoft.com/office/drawing/2010/main">
+        <mc:Choice Requires="a14">
+          <p:sp>
+            <p:nvSpPr>
+              <p:cNvPr id="30" name="Rectangle 29"/>
+              <p:cNvSpPr/>
+              <p:nvPr/>
+            </p:nvSpPr>
+            <p:spPr>
+              <a:xfrm>
+                <a:off x="7368751" y="1584705"/>
+                <a:ext cx="1337359" cy="349978"/>
+              </a:xfrm>
+              <a:prstGeom prst="rect">
+                <a:avLst/>
+              </a:prstGeom>
+              <a:solidFill>
+                <a:schemeClr val="accent4">
+                  <a:lumMod val="20000"/>
+                  <a:lumOff val="80000"/>
+                </a:schemeClr>
+              </a:solidFill>
+              <a:ln>
+                <a:solidFill>
+                  <a:schemeClr val="accent4">
+                    <a:lumMod val="50000"/>
+                  </a:schemeClr>
+                </a:solidFill>
+                <a:prstDash val="solid"/>
+              </a:ln>
+            </p:spPr>
+            <p:style>
+              <a:lnRef idx="2">
+                <a:schemeClr val="accent1">
+                  <a:shade val="50000"/>
+                </a:schemeClr>
+              </a:lnRef>
+              <a:fillRef idx="1">
+                <a:schemeClr val="accent1"/>
+              </a:fillRef>
+              <a:effectRef idx="0">
+                <a:schemeClr val="accent1"/>
+              </a:effectRef>
+              <a:fontRef idx="minor">
+                <a:schemeClr val="lt1"/>
+              </a:fontRef>
+            </p:style>
+            <p:txBody>
+              <a:bodyPr rtlCol="0" anchor="ctr"/>
+              <a:lstStyle/>
+              <a:p>
+                <a:pPr algn="ctr"/>
+                <a14:m>
+                  <m:oMath xmlns:m="http://schemas.openxmlformats.org/officeDocument/2006/math">
+                    <m:r>
+                      <a:rPr lang="en-US" b="0" i="1" smtClean="0">
+                        <a:solidFill>
+                          <a:schemeClr val="tx1"/>
+                        </a:solidFill>
+                        <a:latin typeface="Cambria Math" panose="02040503050406030204" pitchFamily="18" charset="0"/>
+                      </a:rPr>
+                      <m:t>𝐸</m:t>
+                    </m:r>
+                  </m:oMath>
+                </a14:m>
+                <a:r>
+                  <a:rPr lang="en-US" dirty="0">
+                    <a:solidFill>
+                      <a:schemeClr val="tx1"/>
+                    </a:solidFill>
+                  </a:rPr>
+                  <a:t> </a:t>
+                </a:r>
+                <a:r>
+                  <a:rPr lang="en-US" dirty="0">
+                    <a:solidFill>
+                      <a:schemeClr val="tx1"/>
+                    </a:solidFill>
+                    <a:latin typeface="Consolas" panose="020B0609020204030204" pitchFamily="49" charset="0"/>
+                  </a:rPr>
+                  <a:t>uint</a:t>
+                </a:r>
+              </a:p>
+            </p:txBody>
+          </p:sp>
+        </mc:Choice>
+        <mc:Fallback xmlns="">
+          <p:sp>
+            <p:nvSpPr>
+              <p:cNvPr id="30" name="Rectangle 29"/>
+              <p:cNvSpPr>
+                <a:spLocks noRot="1" noChangeAspect="1" noMove="1" noResize="1" noEditPoints="1" noAdjustHandles="1" noChangeArrowheads="1" noChangeShapeType="1" noTextEdit="1"/>
+              </p:cNvSpPr>
+              <p:nvPr/>
+            </p:nvSpPr>
+            <p:spPr>
+              <a:xfrm>
+                <a:off x="7368751" y="1584705"/>
+                <a:ext cx="1337359" cy="349978"/>
+              </a:xfrm>
+              <a:prstGeom prst="rect">
+                <a:avLst/>
+              </a:prstGeom>
+              <a:blipFill>
+                <a:blip r:embed="rId7"/>
+                <a:stretch>
+                  <a:fillRect t="-10169" b="-28814"/>
+                </a:stretch>
+              </a:blipFill>
+              <a:ln>
+                <a:solidFill>
+                  <a:schemeClr val="accent4">
+                    <a:lumMod val="50000"/>
+                  </a:schemeClr>
+                </a:solidFill>
+                <a:prstDash val="solid"/>
+              </a:ln>
+            </p:spPr>
+            <p:txBody>
+              <a:bodyPr/>
+              <a:lstStyle/>
+              <a:p>
+                <a:r>
+                  <a:rPr lang="en-US">
+                    <a:noFill/>
+                  </a:rPr>
+                  <a:t> </a:t>
+                </a:r>
+              </a:p>
+            </p:txBody>
+          </p:sp>
+        </mc:Fallback>
+      </mc:AlternateContent>
+      <p:sp>
+        <p:nvSpPr>
+          <p:cNvPr id="32" name="Rectangle 31"/>
+          <p:cNvSpPr/>
+          <p:nvPr/>
+        </p:nvSpPr>
+        <p:spPr>
+          <a:xfrm>
+            <a:off x="7368750" y="1934684"/>
+            <a:ext cx="1337359" cy="1565067"/>
+          </a:xfrm>
+          <a:prstGeom prst="rect">
+            <a:avLst/>
+          </a:prstGeom>
+          <a:solidFill>
+            <a:schemeClr val="accent5">
+              <a:lumMod val="20000"/>
+              <a:lumOff val="80000"/>
+            </a:schemeClr>
+          </a:solidFill>
+          <a:ln>
+            <a:solidFill>
+              <a:schemeClr val="accent5">
+                <a:lumMod val="50000"/>
+              </a:schemeClr>
+            </a:solidFill>
+            <a:prstDash val="solid"/>
+          </a:ln>
+        </p:spPr>
+        <p:style>
+          <a:lnRef idx="2">
+            <a:schemeClr val="accent1">
+              <a:shade val="50000"/>
+            </a:schemeClr>
+          </a:lnRef>
+          <a:fillRef idx="1">
+            <a:schemeClr val="accent1"/>
+          </a:fillRef>
+          <a:effectRef idx="0">
+            <a:schemeClr val="accent1"/>
+          </a:effectRef>
+          <a:fontRef idx="minor">
+            <a:schemeClr val="lt1"/>
+          </a:fontRef>
+        </p:style>
+        <p:txBody>
+          <a:bodyPr rtlCol="0" anchor="ctr"/>
+          <a:lstStyle/>
+          <a:p>
+            <a:pPr algn="ctr"/>
+            <a:r>
+              <a:rPr lang="en-US" dirty="0">
+                <a:solidFill>
+                  <a:schemeClr val="tx1"/>
+                </a:solidFill>
+              </a:rPr>
+              <a:t>edge</a:t>
+            </a:r>
+          </a:p>
+          <a:p>
+            <a:pPr algn="ctr"/>
+            <a:r>
+              <a:rPr lang="en-US" dirty="0">
+                <a:solidFill>
+                  <a:schemeClr val="tx1"/>
+                </a:solidFill>
+              </a:rPr>
+              <a:t>indices</a:t>
+            </a:r>
+          </a:p>
+          <a:p>
+            <a:pPr algn="ctr"/>
+            <a:endParaRPr lang="en-US" dirty="0">
+              <a:solidFill>
+                <a:schemeClr val="tx1"/>
+              </a:solidFill>
+            </a:endParaRPr>
+          </a:p>
+          <a:p>
+            <a:pPr algn="ctr"/>
+            <a:r>
+              <a:rPr lang="en-US" dirty="0">
+                <a:solidFill>
+                  <a:schemeClr val="tx1"/>
+                </a:solidFill>
+              </a:rPr>
+              <a:t>4 bytes</a:t>
+            </a:r>
+          </a:p>
+          <a:p>
+            <a:pPr algn="ctr"/>
+            <a:r>
+              <a:rPr lang="en-US" dirty="0">
+                <a:solidFill>
+                  <a:schemeClr val="tx1"/>
+                </a:solidFill>
+              </a:rPr>
+              <a:t>each</a:t>
+            </a:r>
+          </a:p>
+        </p:txBody>
+      </p:sp>
+      <p:sp>
+        <p:nvSpPr>
+          <p:cNvPr id="33" name="Rectangle 32"/>
+          <p:cNvSpPr/>
+          <p:nvPr/>
+        </p:nvSpPr>
+        <p:spPr>
+          <a:xfrm>
+            <a:off x="9113433" y="4869837"/>
+            <a:ext cx="1337359" cy="699570"/>
+          </a:xfrm>
+          <a:prstGeom prst="rect">
+            <a:avLst/>
+          </a:prstGeom>
+          <a:solidFill>
+            <a:srgbClr val="E1CCF0"/>
+          </a:solidFill>
+          <a:ln>
+            <a:solidFill>
+              <a:srgbClr val="7030A0"/>
+            </a:solidFill>
+            <a:prstDash val="solid"/>
+          </a:ln>
+        </p:spPr>
+        <p:style>
+          <a:lnRef idx="2">
+            <a:schemeClr val="accent1">
+              <a:shade val="50000"/>
+            </a:schemeClr>
+          </a:lnRef>
+          <a:fillRef idx="1">
+            <a:schemeClr val="accent1"/>
+          </a:fillRef>
+          <a:effectRef idx="0">
+            <a:schemeClr val="accent1"/>
+          </a:effectRef>
+          <a:fontRef idx="minor">
+            <a:schemeClr val="lt1"/>
+          </a:fontRef>
+        </p:style>
+        <p:txBody>
+          <a:bodyPr rtlCol="0" anchor="ctr"/>
+          <a:lstStyle/>
+          <a:p>
+            <a:pPr algn="ctr"/>
+            <a:r>
+              <a:rPr lang="en-US" dirty="0">
+                <a:solidFill>
+                  <a:schemeClr val="tx1"/>
+                </a:solidFill>
+              </a:rPr>
+              <a:t>surface data</a:t>
+            </a:r>
+          </a:p>
+          <a:p>
+            <a:pPr algn="ctr"/>
+            <a:r>
+              <a:rPr lang="en-US" dirty="0">
+                <a:solidFill>
+                  <a:schemeClr val="tx1"/>
+                </a:solidFill>
+              </a:rPr>
+              <a:t>(binary)</a:t>
+            </a:r>
+          </a:p>
+        </p:txBody>
+      </p:sp>
+      <p:sp>
+        <p:nvSpPr>
+          <p:cNvPr id="34" name="TextBox 33"/>
+          <p:cNvSpPr txBox="1"/>
+          <p:nvPr/>
+        </p:nvSpPr>
+        <p:spPr>
+          <a:xfrm>
+            <a:off x="5800115" y="165438"/>
+            <a:ext cx="777329" cy="369332"/>
+          </a:xfrm>
+          <a:prstGeom prst="rect">
+            <a:avLst/>
+          </a:prstGeom>
+          <a:noFill/>
+        </p:spPr>
+        <p:txBody>
+          <a:bodyPr wrap="none" rtlCol="0">
+            <a:spAutoFit/>
+          </a:bodyPr>
+          <a:lstStyle/>
+          <a:p>
+            <a:pPr algn="ctr"/>
+            <a:r>
+              <a:rPr lang="en-US" dirty="0"/>
+              <a:t>binary</a:t>
+            </a:r>
+          </a:p>
+        </p:txBody>
+      </p:sp>
+      <p:sp>
+        <p:nvSpPr>
+          <p:cNvPr id="35" name="TextBox 34"/>
+          <p:cNvSpPr txBox="1"/>
+          <p:nvPr/>
+        </p:nvSpPr>
+        <p:spPr>
+          <a:xfrm>
+            <a:off x="7653451" y="165438"/>
+            <a:ext cx="767967" cy="369332"/>
+          </a:xfrm>
+          <a:prstGeom prst="rect">
+            <a:avLst/>
+          </a:prstGeom>
+          <a:noFill/>
+        </p:spPr>
+        <p:txBody>
+          <a:bodyPr wrap="none" rtlCol="0">
+            <a:spAutoFit/>
+          </a:bodyPr>
+          <a:lstStyle/>
+          <a:p>
+            <a:pPr algn="ctr"/>
+            <a:r>
+              <a:rPr lang="en-US" dirty="0"/>
+              <a:t>vertex</a:t>
+            </a:r>
+          </a:p>
+        </p:txBody>
+      </p:sp>
+      <p:cxnSp>
+        <p:nvCxnSpPr>
+          <p:cNvPr id="37" name="Elbow Connector 36"/>
+          <p:cNvCxnSpPr>
+            <a:stCxn id="4" idx="3"/>
+            <a:endCxn id="66" idx="1"/>
+          </p:cNvCxnSpPr>
+          <p:nvPr/>
+        </p:nvCxnSpPr>
+        <p:spPr>
+          <a:xfrm>
+            <a:off x="2266166" y="1402847"/>
+            <a:ext cx="610876" cy="1854159"/>
+          </a:xfrm>
+          <a:prstGeom prst="bentConnector3">
+            <a:avLst>
+              <a:gd name="adj1" fmla="val 50000"/>
+            </a:avLst>
+          </a:prstGeom>
+          <a:ln w="76200">
+            <a:solidFill>
+              <a:schemeClr val="tx1"/>
+            </a:solidFill>
+            <a:tailEnd type="triangle"/>
+          </a:ln>
+        </p:spPr>
+        <p:style>
+          <a:lnRef idx="1">
+            <a:schemeClr val="accent1"/>
+          </a:lnRef>
+          <a:fillRef idx="0">
+            <a:schemeClr val="accent1"/>
+          </a:fillRef>
+          <a:effectRef idx="0">
+            <a:schemeClr val="accent1"/>
+          </a:effectRef>
+          <a:fontRef idx="minor">
+            <a:schemeClr val="tx1"/>
+          </a:fontRef>
+        </p:style>
+      </p:cxnSp>
+      <p:cxnSp>
+        <p:nvCxnSpPr>
+          <p:cNvPr id="44" name="Elbow Connector 43"/>
+          <p:cNvCxnSpPr>
+            <a:cxnSpLocks/>
+            <a:stCxn id="25" idx="3"/>
+            <a:endCxn id="32" idx="1"/>
+          </p:cNvCxnSpPr>
+          <p:nvPr/>
+        </p:nvCxnSpPr>
+        <p:spPr>
+          <a:xfrm>
+            <a:off x="6857460" y="968539"/>
+            <a:ext cx="511290" cy="1748679"/>
+          </a:xfrm>
+          <a:prstGeom prst="bentConnector3">
+            <a:avLst/>
+          </a:prstGeom>
+          <a:ln w="38100">
+            <a:solidFill>
+              <a:schemeClr val="tx1"/>
+            </a:solidFill>
+            <a:tailEnd type="triangle"/>
+          </a:ln>
+        </p:spPr>
+        <p:style>
+          <a:lnRef idx="1">
+            <a:schemeClr val="accent1"/>
+          </a:lnRef>
+          <a:fillRef idx="0">
+            <a:schemeClr val="accent1"/>
+          </a:fillRef>
+          <a:effectRef idx="0">
+            <a:schemeClr val="accent1"/>
+          </a:effectRef>
+          <a:fontRef idx="minor">
+            <a:schemeClr val="tx1"/>
+          </a:fontRef>
+        </p:style>
+      </p:cxnSp>
+      <mc:AlternateContent xmlns:mc="http://schemas.openxmlformats.org/markup-compatibility/2006" xmlns:a14="http://schemas.microsoft.com/office/drawing/2010/main">
+        <mc:Choice Requires="a14">
+          <p:sp>
+            <p:nvSpPr>
+              <p:cNvPr id="47" name="Rectangle 46"/>
+              <p:cNvSpPr/>
+              <p:nvPr/>
+            </p:nvSpPr>
+            <p:spPr>
+              <a:xfrm>
+                <a:off x="9113439" y="534770"/>
+                <a:ext cx="1337359" cy="349979"/>
+              </a:xfrm>
+              <a:prstGeom prst="rect">
+                <a:avLst/>
+              </a:prstGeom>
+              <a:solidFill>
+                <a:schemeClr val="accent6">
+                  <a:lumMod val="20000"/>
+                  <a:lumOff val="80000"/>
+                </a:schemeClr>
+              </a:solidFill>
+              <a:ln>
+                <a:solidFill>
+                  <a:schemeClr val="accent6">
+                    <a:lumMod val="50000"/>
+                  </a:schemeClr>
+                </a:solidFill>
+                <a:prstDash val="solid"/>
+              </a:ln>
+            </p:spPr>
+            <p:style>
+              <a:lnRef idx="2">
+                <a:schemeClr val="accent1">
+                  <a:shade val="50000"/>
+                </a:schemeClr>
+              </a:lnRef>
+              <a:fillRef idx="1">
+                <a:schemeClr val="accent1"/>
+              </a:fillRef>
+              <a:effectRef idx="0">
+                <a:schemeClr val="accent1"/>
+              </a:effectRef>
+              <a:fontRef idx="minor">
+                <a:schemeClr val="lt1"/>
+              </a:fontRef>
+            </p:style>
+            <p:txBody>
+              <a:bodyPr rtlCol="0" anchor="ctr"/>
+              <a:lstStyle/>
+              <a:p>
+                <a:pPr algn="ctr"/>
+                <a14:m>
+                  <m:oMath xmlns:m="http://schemas.openxmlformats.org/officeDocument/2006/math">
+                    <m:sSub>
+                      <m:sSubPr>
+                        <m:ctrlPr>
+                          <a:rPr lang="en-US" b="0" i="1" smtClean="0">
+                            <a:solidFill>
+                              <a:schemeClr val="tx1"/>
+                            </a:solidFill>
+                            <a:latin typeface="Cambria Math" panose="02040503050406030204" pitchFamily="18" charset="0"/>
+                          </a:rPr>
+                        </m:ctrlPr>
+                      </m:sSubPr>
+                      <m:e>
+                        <m:r>
+                          <a:rPr lang="en-US" b="0" i="1" smtClean="0">
+                            <a:solidFill>
+                              <a:schemeClr val="tx1"/>
+                            </a:solidFill>
+                            <a:latin typeface="Cambria Math" panose="02040503050406030204" pitchFamily="18" charset="0"/>
+                          </a:rPr>
+                          <m:t>𝑣</m:t>
+                        </m:r>
+                      </m:e>
+                      <m:sub>
+                        <m:r>
+                          <a:rPr lang="en-US" b="0" i="1" smtClean="0">
+                            <a:solidFill>
+                              <a:schemeClr val="tx1"/>
+                            </a:solidFill>
+                            <a:latin typeface="Cambria Math" panose="02040503050406030204" pitchFamily="18" charset="0"/>
+                          </a:rPr>
+                          <m:t>0</m:t>
+                        </m:r>
+                      </m:sub>
+                    </m:sSub>
+                  </m:oMath>
+                </a14:m>
+                <a:r>
+                  <a:rPr lang="en-US" dirty="0">
+                    <a:solidFill>
+                      <a:schemeClr val="tx1"/>
+                    </a:solidFill>
+                  </a:rPr>
+                  <a:t> </a:t>
+                </a:r>
+                <a:r>
+                  <a:rPr lang="en-US" dirty="0">
+                    <a:solidFill>
+                      <a:schemeClr val="tx1"/>
+                    </a:solidFill>
+                    <a:latin typeface="Consolas" panose="020B0609020204030204" pitchFamily="49" charset="0"/>
+                  </a:rPr>
+                  <a:t>uint</a:t>
+                </a:r>
+              </a:p>
+            </p:txBody>
+          </p:sp>
+        </mc:Choice>
+        <mc:Fallback xmlns="">
+          <p:sp>
+            <p:nvSpPr>
+              <p:cNvPr id="47" name="Rectangle 46"/>
+              <p:cNvSpPr>
+                <a:spLocks noRot="1" noChangeAspect="1" noMove="1" noResize="1" noEditPoints="1" noAdjustHandles="1" noChangeArrowheads="1" noChangeShapeType="1" noTextEdit="1"/>
+              </p:cNvSpPr>
+              <p:nvPr/>
+            </p:nvSpPr>
+            <p:spPr>
+              <a:xfrm>
+                <a:off x="9113439" y="534770"/>
+                <a:ext cx="1337359" cy="349979"/>
+              </a:xfrm>
+              <a:prstGeom prst="rect">
+                <a:avLst/>
+              </a:prstGeom>
+              <a:blipFill>
+                <a:blip r:embed="rId9"/>
+                <a:stretch>
+                  <a:fillRect t="-10169" b="-27119"/>
+                </a:stretch>
+              </a:blipFill>
+              <a:ln>
+                <a:solidFill>
+                  <a:schemeClr val="accent6">
+                    <a:lumMod val="50000"/>
+                  </a:schemeClr>
+                </a:solidFill>
+                <a:prstDash val="solid"/>
+              </a:ln>
+            </p:spPr>
+            <p:txBody>
+              <a:bodyPr/>
+              <a:lstStyle/>
+              <a:p>
+                <a:r>
+                  <a:rPr lang="en-US">
+                    <a:noFill/>
+                  </a:rPr>
+                  <a:t> </a:t>
+                </a:r>
+              </a:p>
+            </p:txBody>
+          </p:sp>
+        </mc:Fallback>
+      </mc:AlternateContent>
+      <mc:AlternateContent xmlns:mc="http://schemas.openxmlformats.org/markup-compatibility/2006" xmlns:a14="http://schemas.microsoft.com/office/drawing/2010/main">
+        <mc:Choice Requires="a14">
+          <p:sp>
+            <p:nvSpPr>
+              <p:cNvPr id="48" name="Rectangle 47"/>
+              <p:cNvSpPr/>
+              <p:nvPr/>
+            </p:nvSpPr>
+            <p:spPr>
+              <a:xfrm>
+                <a:off x="9113438" y="884749"/>
+                <a:ext cx="1337359" cy="349979"/>
+              </a:xfrm>
+              <a:prstGeom prst="rect">
+                <a:avLst/>
+              </a:prstGeom>
+              <a:solidFill>
+                <a:schemeClr val="accent6">
+                  <a:lumMod val="20000"/>
+                  <a:lumOff val="80000"/>
+                </a:schemeClr>
+              </a:solidFill>
+              <a:ln>
+                <a:solidFill>
+                  <a:schemeClr val="accent6">
+                    <a:lumMod val="50000"/>
+                  </a:schemeClr>
+                </a:solidFill>
+                <a:prstDash val="solid"/>
+              </a:ln>
+            </p:spPr>
+            <p:style>
+              <a:lnRef idx="2">
+                <a:schemeClr val="accent1">
+                  <a:shade val="50000"/>
+                </a:schemeClr>
+              </a:lnRef>
+              <a:fillRef idx="1">
+                <a:schemeClr val="accent1"/>
+              </a:fillRef>
+              <a:effectRef idx="0">
+                <a:schemeClr val="accent1"/>
+              </a:effectRef>
+              <a:fontRef idx="minor">
+                <a:schemeClr val="lt1"/>
+              </a:fontRef>
+            </p:style>
+            <p:txBody>
+              <a:bodyPr rtlCol="0" anchor="ctr"/>
+              <a:lstStyle/>
+              <a:p>
+                <a:pPr algn="ctr"/>
+                <a14:m>
+                  <m:oMath xmlns:m="http://schemas.openxmlformats.org/officeDocument/2006/math">
+                    <m:sSub>
+                      <m:sSubPr>
+                        <m:ctrlPr>
+                          <a:rPr lang="en-US" b="0" i="1" smtClean="0">
+                            <a:solidFill>
+                              <a:schemeClr val="tx1"/>
+                            </a:solidFill>
+                            <a:latin typeface="Cambria Math" panose="02040503050406030204" pitchFamily="18" charset="0"/>
+                          </a:rPr>
+                        </m:ctrlPr>
+                      </m:sSubPr>
+                      <m:e>
+                        <m:r>
+                          <a:rPr lang="en-US" b="0" i="1" smtClean="0">
+                            <a:solidFill>
+                              <a:schemeClr val="tx1"/>
+                            </a:solidFill>
+                            <a:latin typeface="Cambria Math" panose="02040503050406030204" pitchFamily="18" charset="0"/>
+                          </a:rPr>
+                          <m:t>𝑣</m:t>
+                        </m:r>
+                      </m:e>
+                      <m:sub>
+                        <m:r>
+                          <a:rPr lang="en-US" b="0" i="1" smtClean="0">
+                            <a:solidFill>
+                              <a:schemeClr val="tx1"/>
+                            </a:solidFill>
+                            <a:latin typeface="Cambria Math" panose="02040503050406030204" pitchFamily="18" charset="0"/>
+                          </a:rPr>
+                          <m:t>1</m:t>
+                        </m:r>
+                      </m:sub>
+                    </m:sSub>
+                  </m:oMath>
+                </a14:m>
+                <a:r>
+                  <a:rPr lang="en-US" dirty="0">
+                    <a:solidFill>
+                      <a:schemeClr val="tx1"/>
+                    </a:solidFill>
+                  </a:rPr>
+                  <a:t> </a:t>
+                </a:r>
+                <a:r>
+                  <a:rPr lang="en-US" dirty="0">
+                    <a:solidFill>
+                      <a:schemeClr val="tx1"/>
+                    </a:solidFill>
+                    <a:latin typeface="Consolas" panose="020B0609020204030204" pitchFamily="49" charset="0"/>
+                  </a:rPr>
+                  <a:t>uint</a:t>
+                </a:r>
+                <a:endParaRPr lang="en-US" dirty="0">
+                  <a:solidFill>
+                    <a:schemeClr val="tx1"/>
+                  </a:solidFill>
+                </a:endParaRPr>
+              </a:p>
+            </p:txBody>
+          </p:sp>
+        </mc:Choice>
+        <mc:Fallback xmlns="">
+          <p:sp>
+            <p:nvSpPr>
+              <p:cNvPr id="48" name="Rectangle 47"/>
+              <p:cNvSpPr>
+                <a:spLocks noRot="1" noChangeAspect="1" noMove="1" noResize="1" noEditPoints="1" noAdjustHandles="1" noChangeArrowheads="1" noChangeShapeType="1" noTextEdit="1"/>
+              </p:cNvSpPr>
+              <p:nvPr/>
+            </p:nvSpPr>
+            <p:spPr>
+              <a:xfrm>
+                <a:off x="9113438" y="884749"/>
+                <a:ext cx="1337359" cy="349979"/>
+              </a:xfrm>
+              <a:prstGeom prst="rect">
+                <a:avLst/>
+              </a:prstGeom>
+              <a:blipFill>
+                <a:blip r:embed="rId10"/>
+                <a:stretch>
+                  <a:fillRect t="-10000" b="-26667"/>
+                </a:stretch>
+              </a:blipFill>
+              <a:ln>
+                <a:solidFill>
+                  <a:schemeClr val="accent6">
+                    <a:lumMod val="50000"/>
+                  </a:schemeClr>
+                </a:solidFill>
+                <a:prstDash val="solid"/>
+              </a:ln>
+            </p:spPr>
+            <p:txBody>
+              <a:bodyPr/>
+              <a:lstStyle/>
+              <a:p>
+                <a:r>
+                  <a:rPr lang="en-US">
+                    <a:noFill/>
+                  </a:rPr>
+                  <a:t> </a:t>
+                </a:r>
+              </a:p>
+            </p:txBody>
+          </p:sp>
+        </mc:Fallback>
+      </mc:AlternateContent>
+      <p:sp>
+        <p:nvSpPr>
+          <p:cNvPr id="50" name="Rectangle 49"/>
+          <p:cNvSpPr/>
+          <p:nvPr/>
+        </p:nvSpPr>
+        <p:spPr>
+          <a:xfrm>
+            <a:off x="9113436" y="1236899"/>
+            <a:ext cx="1337359" cy="349979"/>
+          </a:xfrm>
+          <a:prstGeom prst="rect">
+            <a:avLst/>
+          </a:prstGeom>
+          <a:solidFill>
+            <a:schemeClr val="accent4">
+              <a:lumMod val="20000"/>
+              <a:lumOff val="80000"/>
+            </a:schemeClr>
+          </a:solidFill>
+          <a:ln>
+            <a:solidFill>
+              <a:schemeClr val="accent4">
+                <a:lumMod val="50000"/>
+              </a:schemeClr>
+            </a:solidFill>
+            <a:prstDash val="solid"/>
+          </a:ln>
+        </p:spPr>
+        <p:style>
+          <a:lnRef idx="2">
+            <a:schemeClr val="accent1">
+              <a:shade val="50000"/>
+            </a:schemeClr>
+          </a:lnRef>
+          <a:fillRef idx="1">
+            <a:schemeClr val="accent1"/>
+          </a:fillRef>
+          <a:effectRef idx="0">
+            <a:schemeClr val="accent1"/>
+          </a:effectRef>
+          <a:fontRef idx="minor">
+            <a:schemeClr val="lt1"/>
+          </a:fontRef>
+        </p:style>
+        <p:txBody>
+          <a:bodyPr rtlCol="0" anchor="ctr"/>
+          <a:lstStyle/>
+          <a:p>
+            <a:pPr algn="ctr"/>
+            <a:r>
+              <a:rPr lang="en-US" dirty="0">
+                <a:solidFill>
+                  <a:schemeClr val="tx1"/>
+                </a:solidFill>
+              </a:rPr>
+              <a:t># pts </a:t>
+            </a:r>
+            <a:r>
+              <a:rPr lang="en-US" dirty="0" err="1">
+                <a:solidFill>
+                  <a:schemeClr val="tx1"/>
+                </a:solidFill>
+                <a:latin typeface="Consolas" panose="020B0609020204030204" pitchFamily="49" charset="0"/>
+              </a:rPr>
+              <a:t>uint</a:t>
+            </a:r>
+            <a:endParaRPr lang="en-US" dirty="0">
+              <a:solidFill>
+                <a:schemeClr val="tx1"/>
+              </a:solidFill>
+              <a:latin typeface="Consolas" panose="020B0609020204030204" pitchFamily="49" charset="0"/>
+            </a:endParaRPr>
+          </a:p>
+        </p:txBody>
+      </p:sp>
+      <mc:AlternateContent xmlns:mc="http://schemas.openxmlformats.org/markup-compatibility/2006" xmlns:a14="http://schemas.microsoft.com/office/drawing/2010/main">
+        <mc:Choice Requires="a14">
+          <p:sp>
+            <p:nvSpPr>
+              <p:cNvPr id="52" name="Rectangle 51"/>
+              <p:cNvSpPr/>
+              <p:nvPr/>
+            </p:nvSpPr>
+            <p:spPr>
+              <a:xfrm>
+                <a:off x="9113436" y="1584705"/>
+                <a:ext cx="1337359" cy="2253007"/>
+              </a:xfrm>
+              <a:prstGeom prst="rect">
+                <a:avLst/>
+              </a:prstGeom>
+              <a:solidFill>
+                <a:schemeClr val="accent5">
+                  <a:lumMod val="20000"/>
+                  <a:lumOff val="80000"/>
+                </a:schemeClr>
+              </a:solidFill>
+              <a:ln>
+                <a:solidFill>
+                  <a:schemeClr val="accent5">
+                    <a:lumMod val="50000"/>
+                  </a:schemeClr>
+                </a:solidFill>
+                <a:prstDash val="solid"/>
+              </a:ln>
+            </p:spPr>
+            <p:style>
+              <a:lnRef idx="2">
+                <a:schemeClr val="accent1">
+                  <a:shade val="50000"/>
+                </a:schemeClr>
+              </a:lnRef>
+              <a:fillRef idx="1">
+                <a:schemeClr val="accent1"/>
+              </a:fillRef>
+              <a:effectRef idx="0">
+                <a:schemeClr val="accent1"/>
+              </a:effectRef>
+              <a:fontRef idx="minor">
+                <a:schemeClr val="lt1"/>
+              </a:fontRef>
+            </p:style>
+            <p:txBody>
+              <a:bodyPr rtlCol="0" anchor="ctr"/>
+              <a:lstStyle/>
+              <a:p>
+                <a:pPr algn="ctr"/>
+                <a:endParaRPr lang="en-US" dirty="0">
+                  <a:solidFill>
+                    <a:schemeClr val="tx1"/>
+                  </a:solidFill>
+                </a:endParaRPr>
+              </a:p>
+              <a:p>
+                <a:pPr algn="ctr"/>
+                <a:endParaRPr lang="en-US" dirty="0">
+                  <a:solidFill>
+                    <a:schemeClr val="tx1"/>
+                  </a:solidFill>
+                </a:endParaRPr>
+              </a:p>
+              <a:p>
+                <a:pPr algn="ctr"/>
+                <a:r>
+                  <a:rPr lang="en-US" dirty="0">
+                    <a:solidFill>
+                      <a:schemeClr val="tx1"/>
+                    </a:solidFill>
+                  </a:rPr>
+                  <a:t>points and radii given sequentially </a:t>
+                </a:r>
+                <a14:m>
+                  <m:oMath xmlns:m="http://schemas.openxmlformats.org/officeDocument/2006/math">
+                    <m:sSub>
+                      <m:sSubPr>
+                        <m:ctrlPr>
+                          <a:rPr lang="en-US" i="1">
+                            <a:solidFill>
+                              <a:schemeClr val="tx1"/>
+                            </a:solidFill>
+                            <a:latin typeface="Cambria Math" panose="02040503050406030204" pitchFamily="18" charset="0"/>
+                          </a:rPr>
+                        </m:ctrlPr>
+                      </m:sSubPr>
+                      <m:e>
+                        <m:r>
+                          <a:rPr lang="en-US" i="1">
+                            <a:solidFill>
+                              <a:schemeClr val="tx1"/>
+                            </a:solidFill>
+                            <a:latin typeface="Cambria Math" panose="02040503050406030204" pitchFamily="18" charset="0"/>
+                          </a:rPr>
+                          <m:t>𝑣</m:t>
+                        </m:r>
+                      </m:e>
+                      <m:sub>
+                        <m:r>
+                          <a:rPr lang="en-US" i="1">
+                            <a:solidFill>
+                              <a:schemeClr val="tx1"/>
+                            </a:solidFill>
+                            <a:latin typeface="Cambria Math" panose="02040503050406030204" pitchFamily="18" charset="0"/>
+                          </a:rPr>
+                          <m:t>0</m:t>
+                        </m:r>
+                      </m:sub>
+                    </m:sSub>
+                    <m:r>
+                      <a:rPr lang="en-US" b="0" i="1" smtClean="0">
+                        <a:solidFill>
+                          <a:schemeClr val="tx1"/>
+                        </a:solidFill>
+                        <a:latin typeface="Cambria Math" panose="02040503050406030204" pitchFamily="18" charset="0"/>
+                      </a:rPr>
+                      <m:t>→</m:t>
+                    </m:r>
+                    <m:sSub>
+                      <m:sSubPr>
+                        <m:ctrlPr>
+                          <a:rPr lang="en-US" i="1">
+                            <a:solidFill>
+                              <a:schemeClr val="tx1"/>
+                            </a:solidFill>
+                            <a:latin typeface="Cambria Math" panose="02040503050406030204" pitchFamily="18" charset="0"/>
+                          </a:rPr>
+                        </m:ctrlPr>
+                      </m:sSubPr>
+                      <m:e>
+                        <m:r>
+                          <a:rPr lang="en-US" i="1">
+                            <a:solidFill>
+                              <a:schemeClr val="tx1"/>
+                            </a:solidFill>
+                            <a:latin typeface="Cambria Math" panose="02040503050406030204" pitchFamily="18" charset="0"/>
+                          </a:rPr>
+                          <m:t>𝑣</m:t>
+                        </m:r>
+                      </m:e>
+                      <m:sub>
+                        <m:r>
+                          <a:rPr lang="en-US" i="1">
+                            <a:solidFill>
+                              <a:schemeClr val="tx1"/>
+                            </a:solidFill>
+                            <a:latin typeface="Cambria Math" panose="02040503050406030204" pitchFamily="18" charset="0"/>
+                          </a:rPr>
+                          <m:t>1</m:t>
+                        </m:r>
+                      </m:sub>
+                    </m:sSub>
+                  </m:oMath>
+                </a14:m>
+                <a:endParaRPr lang="en-US" dirty="0">
+                  <a:solidFill>
+                    <a:schemeClr val="tx1"/>
+                  </a:solidFill>
+                </a:endParaRPr>
+              </a:p>
+              <a:p>
+                <a:pPr algn="ctr"/>
+                <a:endParaRPr lang="en-US" dirty="0">
+                  <a:solidFill>
+                    <a:schemeClr val="tx1"/>
+                  </a:solidFill>
+                </a:endParaRPr>
+              </a:p>
+              <a:p>
+                <a:pPr algn="ctr"/>
+                <a:r>
+                  <a:rPr lang="en-US" dirty="0">
+                    <a:solidFill>
+                      <a:schemeClr val="tx1"/>
+                    </a:solidFill>
+                  </a:rPr>
+                  <a:t>4x </a:t>
+                </a:r>
+                <a:r>
+                  <a:rPr lang="en-US" dirty="0">
+                    <a:solidFill>
+                      <a:schemeClr val="tx1"/>
+                    </a:solidFill>
+                    <a:latin typeface="Consolas" panose="020B0609020204030204" pitchFamily="49" charset="0"/>
+                  </a:rPr>
+                  <a:t>float</a:t>
+                </a:r>
+              </a:p>
+            </p:txBody>
+          </p:sp>
+        </mc:Choice>
+        <mc:Fallback xmlns="">
+          <p:sp>
+            <p:nvSpPr>
+              <p:cNvPr id="52" name="Rectangle 51"/>
+              <p:cNvSpPr>
+                <a:spLocks noRot="1" noChangeAspect="1" noMove="1" noResize="1" noEditPoints="1" noAdjustHandles="1" noChangeArrowheads="1" noChangeShapeType="1" noTextEdit="1"/>
+              </p:cNvSpPr>
+              <p:nvPr/>
+            </p:nvSpPr>
+            <p:spPr>
+              <a:xfrm>
+                <a:off x="9113436" y="1584705"/>
+                <a:ext cx="1337359" cy="2253007"/>
+              </a:xfrm>
+              <a:prstGeom prst="rect">
+                <a:avLst/>
+              </a:prstGeom>
+              <a:blipFill>
+                <a:blip r:embed="rId11"/>
+                <a:stretch>
+                  <a:fillRect l="-2715" r="-5882" b="-4570"/>
+                </a:stretch>
+              </a:blipFill>
+              <a:ln>
+                <a:solidFill>
+                  <a:schemeClr val="accent5">
+                    <a:lumMod val="50000"/>
+                  </a:schemeClr>
+                </a:solidFill>
+                <a:prstDash val="solid"/>
+              </a:ln>
+            </p:spPr>
+            <p:txBody>
+              <a:bodyPr/>
+              <a:lstStyle/>
+              <a:p>
+                <a:r>
+                  <a:rPr lang="en-US">
+                    <a:noFill/>
+                  </a:rPr>
+                  <a:t> </a:t>
+                </a:r>
+              </a:p>
+            </p:txBody>
+          </p:sp>
+        </mc:Fallback>
+      </mc:AlternateContent>
+      <p:sp>
+        <p:nvSpPr>
+          <p:cNvPr id="54" name="TextBox 53"/>
+          <p:cNvSpPr txBox="1"/>
+          <p:nvPr/>
+        </p:nvSpPr>
+        <p:spPr>
+          <a:xfrm>
+            <a:off x="9459917" y="165438"/>
+            <a:ext cx="644408" cy="369332"/>
+          </a:xfrm>
+          <a:prstGeom prst="rect">
+            <a:avLst/>
+          </a:prstGeom>
+          <a:noFill/>
+        </p:spPr>
+        <p:txBody>
+          <a:bodyPr wrap="none" rtlCol="0">
+            <a:spAutoFit/>
+          </a:bodyPr>
+          <a:lstStyle/>
+          <a:p>
+            <a:pPr algn="ctr"/>
+            <a:r>
+              <a:rPr lang="en-US" dirty="0"/>
+              <a:t>edge</a:t>
+            </a:r>
+          </a:p>
+        </p:txBody>
+      </p:sp>
+      <mc:AlternateContent xmlns:mc="http://schemas.openxmlformats.org/markup-compatibility/2006" xmlns:a14="http://schemas.microsoft.com/office/drawing/2010/main">
+        <mc:Choice Requires="a14">
+          <p:sp>
+            <p:nvSpPr>
+              <p:cNvPr id="58" name="Rectangle 57"/>
+              <p:cNvSpPr/>
+              <p:nvPr/>
+            </p:nvSpPr>
+            <p:spPr>
+              <a:xfrm>
+                <a:off x="9113435" y="1818780"/>
+                <a:ext cx="1337359" cy="231807"/>
+              </a:xfrm>
+              <a:prstGeom prst="rect">
+                <a:avLst/>
+              </a:prstGeom>
+              <a:solidFill>
+                <a:schemeClr val="bg1"/>
+              </a:solidFill>
+              <a:ln>
+                <a:solidFill>
+                  <a:schemeClr val="tx1"/>
+                </a:solidFill>
+                <a:prstDash val="sysDash"/>
+              </a:ln>
+            </p:spPr>
+            <p:style>
+              <a:lnRef idx="2">
+                <a:schemeClr val="accent1">
+                  <a:shade val="50000"/>
+                </a:schemeClr>
+              </a:lnRef>
+              <a:fillRef idx="1">
+                <a:schemeClr val="accent1"/>
+              </a:fillRef>
+              <a:effectRef idx="0">
+                <a:schemeClr val="accent1"/>
+              </a:effectRef>
+              <a:fontRef idx="minor">
+                <a:schemeClr val="lt1"/>
+              </a:fontRef>
+            </p:style>
+            <p:txBody>
+              <a:bodyPr rtlCol="0" anchor="ctr"/>
+              <a:lstStyle/>
+              <a:p>
+                <a:pPr algn="ctr"/>
+                <a14:m>
+                  <m:oMathPara xmlns:m="http://schemas.openxmlformats.org/officeDocument/2006/math">
+                    <m:oMathParaPr>
+                      <m:jc m:val="centerGroup"/>
+                    </m:oMathParaPr>
+                    <m:oMath xmlns:m="http://schemas.openxmlformats.org/officeDocument/2006/math">
+                      <m:sSub>
+                        <m:sSubPr>
+                          <m:ctrlPr>
+                            <a:rPr lang="en-US" b="0" i="1" smtClean="0">
+                              <a:solidFill>
+                                <a:schemeClr val="tx1"/>
+                              </a:solidFill>
+                              <a:latin typeface="Cambria Math" panose="02040503050406030204" pitchFamily="18" charset="0"/>
+                            </a:rPr>
+                          </m:ctrlPr>
+                        </m:sSubPr>
+                        <m:e>
+                          <m:r>
+                            <a:rPr lang="en-US" b="0" i="1" smtClean="0">
+                              <a:solidFill>
+                                <a:schemeClr val="tx1"/>
+                              </a:solidFill>
+                              <a:latin typeface="Cambria Math" panose="02040503050406030204" pitchFamily="18" charset="0"/>
+                            </a:rPr>
+                            <m:t>𝑝</m:t>
+                          </m:r>
+                        </m:e>
+                        <m:sub>
+                          <m:r>
+                            <a:rPr lang="en-US" b="0" i="1" smtClean="0">
+                              <a:solidFill>
+                                <a:schemeClr val="tx1"/>
+                              </a:solidFill>
+                              <a:latin typeface="Cambria Math" panose="02040503050406030204" pitchFamily="18" charset="0"/>
+                            </a:rPr>
+                            <m:t>𝑖</m:t>
+                          </m:r>
+                        </m:sub>
+                      </m:sSub>
+                    </m:oMath>
+                  </m:oMathPara>
+                </a14:m>
+                <a:endParaRPr lang="en-US" dirty="0">
+                  <a:solidFill>
+                    <a:schemeClr val="tx1"/>
+                  </a:solidFill>
+                </a:endParaRPr>
+              </a:p>
+            </p:txBody>
+          </p:sp>
+        </mc:Choice>
+        <mc:Fallback xmlns="">
+          <p:sp>
+            <p:nvSpPr>
+              <p:cNvPr id="58" name="Rectangle 57"/>
+              <p:cNvSpPr>
+                <a:spLocks noRot="1" noChangeAspect="1" noMove="1" noResize="1" noEditPoints="1" noAdjustHandles="1" noChangeArrowheads="1" noChangeShapeType="1" noTextEdit="1"/>
+              </p:cNvSpPr>
+              <p:nvPr/>
+            </p:nvSpPr>
+            <p:spPr>
+              <a:xfrm>
+                <a:off x="9113435" y="1818780"/>
+                <a:ext cx="1337359" cy="231807"/>
+              </a:xfrm>
+              <a:prstGeom prst="rect">
+                <a:avLst/>
+              </a:prstGeom>
+              <a:blipFill>
+                <a:blip r:embed="rId12"/>
+                <a:stretch>
+                  <a:fillRect b="-37500"/>
+                </a:stretch>
+              </a:blipFill>
+              <a:ln>
+                <a:solidFill>
+                  <a:schemeClr val="tx1"/>
+                </a:solidFill>
+                <a:prstDash val="sysDash"/>
+              </a:ln>
+            </p:spPr>
+            <p:txBody>
+              <a:bodyPr/>
+              <a:lstStyle/>
+              <a:p>
+                <a:r>
+                  <a:rPr lang="en-US">
+                    <a:noFill/>
+                  </a:rPr>
+                  <a:t> </a:t>
+                </a:r>
+              </a:p>
+            </p:txBody>
+          </p:sp>
+        </mc:Fallback>
+      </mc:AlternateContent>
+      <mc:AlternateContent xmlns:mc="http://schemas.openxmlformats.org/markup-compatibility/2006" xmlns:a14="http://schemas.microsoft.com/office/drawing/2010/main">
+        <mc:Choice Requires="a14">
+          <p:sp>
+            <p:nvSpPr>
+              <p:cNvPr id="59" name="Rectangle 58"/>
+              <p:cNvSpPr/>
+              <p:nvPr/>
+            </p:nvSpPr>
+            <p:spPr>
+              <a:xfrm>
+                <a:off x="10811099" y="1234727"/>
+                <a:ext cx="1337359" cy="349979"/>
+              </a:xfrm>
+              <a:prstGeom prst="rect">
+                <a:avLst/>
+              </a:prstGeom>
+              <a:solidFill>
+                <a:schemeClr val="accent6">
+                  <a:lumMod val="20000"/>
+                  <a:lumOff val="80000"/>
+                </a:schemeClr>
+              </a:solidFill>
+              <a:ln>
+                <a:solidFill>
+                  <a:schemeClr val="accent6">
+                    <a:lumMod val="50000"/>
+                  </a:schemeClr>
+                </a:solidFill>
+                <a:prstDash val="solid"/>
+              </a:ln>
+            </p:spPr>
+            <p:style>
+              <a:lnRef idx="2">
+                <a:schemeClr val="accent1">
+                  <a:shade val="50000"/>
+                </a:schemeClr>
+              </a:lnRef>
+              <a:fillRef idx="1">
+                <a:schemeClr val="accent1"/>
+              </a:fillRef>
+              <a:effectRef idx="0">
+                <a:schemeClr val="accent1"/>
+              </a:effectRef>
+              <a:fontRef idx="minor">
+                <a:schemeClr val="lt1"/>
+              </a:fontRef>
+            </p:style>
+            <p:txBody>
+              <a:bodyPr rtlCol="0" anchor="ctr"/>
+              <a:lstStyle/>
+              <a:p>
+                <a:pPr algn="ctr"/>
+                <a14:m>
+                  <m:oMath xmlns:m="http://schemas.openxmlformats.org/officeDocument/2006/math">
+                    <m:r>
+                      <a:rPr lang="en-US" b="0" i="1" smtClean="0">
+                        <a:solidFill>
+                          <a:schemeClr val="tx1"/>
+                        </a:solidFill>
+                        <a:latin typeface="Cambria Math" panose="02040503050406030204" pitchFamily="18" charset="0"/>
+                      </a:rPr>
+                      <m:t>𝑥</m:t>
+                    </m:r>
+                  </m:oMath>
+                </a14:m>
+                <a:r>
+                  <a:rPr lang="en-US" dirty="0">
+                    <a:solidFill>
+                      <a:schemeClr val="tx1"/>
+                    </a:solidFill>
+                  </a:rPr>
+                  <a:t> </a:t>
+                </a:r>
+                <a:r>
+                  <a:rPr lang="en-US" dirty="0">
+                    <a:solidFill>
+                      <a:schemeClr val="tx1"/>
+                    </a:solidFill>
+                    <a:latin typeface="Consolas" panose="020B0609020204030204" pitchFamily="49" charset="0"/>
+                  </a:rPr>
+                  <a:t>float</a:t>
+                </a:r>
+              </a:p>
+            </p:txBody>
+          </p:sp>
+        </mc:Choice>
+        <mc:Fallback xmlns="">
+          <p:sp>
+            <p:nvSpPr>
+              <p:cNvPr id="59" name="Rectangle 58"/>
+              <p:cNvSpPr>
+                <a:spLocks noRot="1" noChangeAspect="1" noMove="1" noResize="1" noEditPoints="1" noAdjustHandles="1" noChangeArrowheads="1" noChangeShapeType="1" noTextEdit="1"/>
+              </p:cNvSpPr>
+              <p:nvPr/>
+            </p:nvSpPr>
+            <p:spPr>
+              <a:xfrm>
+                <a:off x="10811099" y="1234727"/>
+                <a:ext cx="1337359" cy="349979"/>
+              </a:xfrm>
+              <a:prstGeom prst="rect">
+                <a:avLst/>
+              </a:prstGeom>
+              <a:blipFill>
+                <a:blip r:embed="rId13"/>
+                <a:stretch>
+                  <a:fillRect t="-10169" b="-27119"/>
+                </a:stretch>
+              </a:blipFill>
+              <a:ln>
+                <a:solidFill>
+                  <a:schemeClr val="accent6">
+                    <a:lumMod val="50000"/>
+                  </a:schemeClr>
+                </a:solidFill>
+                <a:prstDash val="solid"/>
+              </a:ln>
+            </p:spPr>
+            <p:txBody>
+              <a:bodyPr/>
+              <a:lstStyle/>
+              <a:p>
+                <a:r>
+                  <a:rPr lang="en-US">
+                    <a:noFill/>
+                  </a:rPr>
+                  <a:t> </a:t>
+                </a:r>
+              </a:p>
+            </p:txBody>
+          </p:sp>
+        </mc:Fallback>
+      </mc:AlternateContent>
+      <mc:AlternateContent xmlns:mc="http://schemas.openxmlformats.org/markup-compatibility/2006" xmlns:a14="http://schemas.microsoft.com/office/drawing/2010/main">
+        <mc:Choice Requires="a14">
+          <p:sp>
+            <p:nvSpPr>
+              <p:cNvPr id="60" name="Rectangle 59"/>
+              <p:cNvSpPr/>
+              <p:nvPr/>
+            </p:nvSpPr>
+            <p:spPr>
+              <a:xfrm>
+                <a:off x="10811098" y="1584706"/>
+                <a:ext cx="1337359" cy="349979"/>
+              </a:xfrm>
+              <a:prstGeom prst="rect">
+                <a:avLst/>
+              </a:prstGeom>
+              <a:solidFill>
+                <a:schemeClr val="accent6">
+                  <a:lumMod val="20000"/>
+                  <a:lumOff val="80000"/>
+                </a:schemeClr>
+              </a:solidFill>
+              <a:ln>
+                <a:solidFill>
+                  <a:schemeClr val="accent6">
+                    <a:lumMod val="50000"/>
+                  </a:schemeClr>
+                </a:solidFill>
+                <a:prstDash val="solid"/>
+              </a:ln>
+            </p:spPr>
+            <p:style>
+              <a:lnRef idx="2">
+                <a:schemeClr val="accent1">
+                  <a:shade val="50000"/>
+                </a:schemeClr>
+              </a:lnRef>
+              <a:fillRef idx="1">
+                <a:schemeClr val="accent1"/>
+              </a:fillRef>
+              <a:effectRef idx="0">
+                <a:schemeClr val="accent1"/>
+              </a:effectRef>
+              <a:fontRef idx="minor">
+                <a:schemeClr val="lt1"/>
+              </a:fontRef>
+            </p:style>
+            <p:txBody>
+              <a:bodyPr rtlCol="0" anchor="ctr"/>
+              <a:lstStyle/>
+              <a:p>
+                <a:pPr algn="ctr"/>
+                <a14:m>
+                  <m:oMath xmlns:m="http://schemas.openxmlformats.org/officeDocument/2006/math">
+                    <m:r>
+                      <a:rPr lang="en-US" b="0" i="1" smtClean="0">
+                        <a:solidFill>
+                          <a:schemeClr val="tx1"/>
+                        </a:solidFill>
+                        <a:latin typeface="Cambria Math" panose="02040503050406030204" pitchFamily="18" charset="0"/>
+                      </a:rPr>
+                      <m:t>𝑦</m:t>
+                    </m:r>
+                  </m:oMath>
+                </a14:m>
+                <a:r>
+                  <a:rPr lang="en-US" dirty="0">
+                    <a:solidFill>
+                      <a:schemeClr val="tx1"/>
+                    </a:solidFill>
+                  </a:rPr>
+                  <a:t> </a:t>
+                </a:r>
+                <a:r>
+                  <a:rPr lang="en-US" dirty="0">
+                    <a:solidFill>
+                      <a:schemeClr val="tx1"/>
+                    </a:solidFill>
+                    <a:latin typeface="Consolas" panose="020B0609020204030204" pitchFamily="49" charset="0"/>
+                  </a:rPr>
+                  <a:t>float</a:t>
+                </a:r>
+                <a:endParaRPr lang="en-US" dirty="0">
+                  <a:solidFill>
+                    <a:schemeClr val="tx1"/>
+                  </a:solidFill>
+                </a:endParaRPr>
+              </a:p>
+            </p:txBody>
+          </p:sp>
+        </mc:Choice>
+        <mc:Fallback xmlns="">
+          <p:sp>
+            <p:nvSpPr>
+              <p:cNvPr id="60" name="Rectangle 59"/>
+              <p:cNvSpPr>
+                <a:spLocks noRot="1" noChangeAspect="1" noMove="1" noResize="1" noEditPoints="1" noAdjustHandles="1" noChangeArrowheads="1" noChangeShapeType="1" noTextEdit="1"/>
+              </p:cNvSpPr>
+              <p:nvPr/>
+            </p:nvSpPr>
+            <p:spPr>
+              <a:xfrm>
+                <a:off x="10811098" y="1584706"/>
+                <a:ext cx="1337359" cy="349979"/>
+              </a:xfrm>
+              <a:prstGeom prst="rect">
+                <a:avLst/>
+              </a:prstGeom>
+              <a:blipFill>
+                <a:blip r:embed="rId14"/>
+                <a:stretch>
+                  <a:fillRect t="-10169" b="-28814"/>
+                </a:stretch>
+              </a:blipFill>
+              <a:ln>
+                <a:solidFill>
+                  <a:schemeClr val="accent6">
+                    <a:lumMod val="50000"/>
+                  </a:schemeClr>
+                </a:solidFill>
+                <a:prstDash val="solid"/>
+              </a:ln>
+            </p:spPr>
+            <p:txBody>
+              <a:bodyPr/>
+              <a:lstStyle/>
+              <a:p>
+                <a:r>
+                  <a:rPr lang="en-US">
+                    <a:noFill/>
+                  </a:rPr>
+                  <a:t> </a:t>
+                </a:r>
+              </a:p>
+            </p:txBody>
+          </p:sp>
+        </mc:Fallback>
+      </mc:AlternateContent>
+      <mc:AlternateContent xmlns:mc="http://schemas.openxmlformats.org/markup-compatibility/2006" xmlns:a14="http://schemas.microsoft.com/office/drawing/2010/main">
+        <mc:Choice Requires="a14">
+          <p:sp>
+            <p:nvSpPr>
+              <p:cNvPr id="61" name="Rectangle 60"/>
+              <p:cNvSpPr/>
+              <p:nvPr/>
+            </p:nvSpPr>
+            <p:spPr>
+              <a:xfrm>
+                <a:off x="10811097" y="1934684"/>
+                <a:ext cx="1337359" cy="349979"/>
+              </a:xfrm>
+              <a:prstGeom prst="rect">
+                <a:avLst/>
+              </a:prstGeom>
+              <a:solidFill>
+                <a:schemeClr val="accent6">
+                  <a:lumMod val="20000"/>
+                  <a:lumOff val="80000"/>
+                </a:schemeClr>
+              </a:solidFill>
+              <a:ln>
+                <a:solidFill>
+                  <a:schemeClr val="accent6">
+                    <a:lumMod val="50000"/>
+                  </a:schemeClr>
+                </a:solidFill>
+                <a:prstDash val="solid"/>
+              </a:ln>
+            </p:spPr>
+            <p:style>
+              <a:lnRef idx="2">
+                <a:schemeClr val="accent1">
+                  <a:shade val="50000"/>
+                </a:schemeClr>
+              </a:lnRef>
+              <a:fillRef idx="1">
+                <a:schemeClr val="accent1"/>
+              </a:fillRef>
+              <a:effectRef idx="0">
+                <a:schemeClr val="accent1"/>
+              </a:effectRef>
+              <a:fontRef idx="minor">
+                <a:schemeClr val="lt1"/>
+              </a:fontRef>
+            </p:style>
+            <p:txBody>
+              <a:bodyPr rtlCol="0" anchor="ctr"/>
+              <a:lstStyle/>
+              <a:p>
+                <a:pPr algn="ctr"/>
+                <a14:m>
+                  <m:oMath xmlns:m="http://schemas.openxmlformats.org/officeDocument/2006/math">
+                    <m:r>
+                      <a:rPr lang="en-US" b="0" i="1" smtClean="0">
+                        <a:solidFill>
+                          <a:schemeClr val="tx1"/>
+                        </a:solidFill>
+                        <a:latin typeface="Cambria Math" panose="02040503050406030204" pitchFamily="18" charset="0"/>
+                      </a:rPr>
+                      <m:t>𝑧</m:t>
+                    </m:r>
+                  </m:oMath>
+                </a14:m>
+                <a:r>
+                  <a:rPr lang="en-US" dirty="0">
+                    <a:solidFill>
+                      <a:schemeClr val="tx1"/>
+                    </a:solidFill>
+                  </a:rPr>
+                  <a:t> </a:t>
+                </a:r>
+                <a:r>
+                  <a:rPr lang="en-US" dirty="0">
+                    <a:solidFill>
+                      <a:schemeClr val="tx1"/>
+                    </a:solidFill>
+                    <a:latin typeface="Consolas" panose="020B0609020204030204" pitchFamily="49" charset="0"/>
+                  </a:rPr>
+                  <a:t>float</a:t>
+                </a:r>
+                <a:endParaRPr lang="en-US" dirty="0">
+                  <a:solidFill>
+                    <a:schemeClr val="tx1"/>
+                  </a:solidFill>
+                </a:endParaRPr>
+              </a:p>
+            </p:txBody>
+          </p:sp>
+        </mc:Choice>
+        <mc:Fallback xmlns="">
+          <p:sp>
+            <p:nvSpPr>
+              <p:cNvPr id="61" name="Rectangle 60"/>
+              <p:cNvSpPr>
+                <a:spLocks noRot="1" noChangeAspect="1" noMove="1" noResize="1" noEditPoints="1" noAdjustHandles="1" noChangeArrowheads="1" noChangeShapeType="1" noTextEdit="1"/>
+              </p:cNvSpPr>
+              <p:nvPr/>
+            </p:nvSpPr>
+            <p:spPr>
+              <a:xfrm>
+                <a:off x="10811097" y="1934684"/>
+                <a:ext cx="1337359" cy="349979"/>
+              </a:xfrm>
+              <a:prstGeom prst="rect">
+                <a:avLst/>
+              </a:prstGeom>
+              <a:blipFill>
+                <a:blip r:embed="rId15"/>
+                <a:stretch>
+                  <a:fillRect t="-8333" b="-26667"/>
+                </a:stretch>
+              </a:blipFill>
+              <a:ln>
+                <a:solidFill>
+                  <a:schemeClr val="accent6">
+                    <a:lumMod val="50000"/>
+                  </a:schemeClr>
+                </a:solidFill>
+                <a:prstDash val="solid"/>
+              </a:ln>
+            </p:spPr>
+            <p:txBody>
+              <a:bodyPr/>
+              <a:lstStyle/>
+              <a:p>
+                <a:r>
+                  <a:rPr lang="en-US">
+                    <a:noFill/>
+                  </a:rPr>
+                  <a:t> </a:t>
+                </a:r>
+              </a:p>
+            </p:txBody>
+          </p:sp>
+        </mc:Fallback>
+      </mc:AlternateContent>
+      <p:cxnSp>
+        <p:nvCxnSpPr>
+          <p:cNvPr id="65" name="Elbow Connector 64"/>
+          <p:cNvCxnSpPr>
+            <a:stCxn id="58" idx="3"/>
+            <a:endCxn id="60" idx="1"/>
+          </p:cNvCxnSpPr>
+          <p:nvPr/>
+        </p:nvCxnSpPr>
+        <p:spPr>
+          <a:xfrm flipV="1">
+            <a:off x="10450794" y="1759696"/>
+            <a:ext cx="360304" cy="174988"/>
+          </a:xfrm>
+          <a:prstGeom prst="bentConnector3">
+            <a:avLst/>
+          </a:prstGeom>
+          <a:ln w="38100">
+            <a:solidFill>
+              <a:schemeClr val="tx1"/>
+            </a:solidFill>
+            <a:tailEnd type="triangle"/>
+          </a:ln>
+        </p:spPr>
+        <p:style>
+          <a:lnRef idx="1">
+            <a:schemeClr val="accent1"/>
+          </a:lnRef>
+          <a:fillRef idx="0">
+            <a:schemeClr val="accent1"/>
+          </a:fillRef>
+          <a:effectRef idx="0">
+            <a:schemeClr val="accent1"/>
+          </a:effectRef>
+          <a:fontRef idx="minor">
+            <a:schemeClr val="tx1"/>
+          </a:fontRef>
+        </p:style>
+      </p:cxnSp>
+      <p:sp>
+        <p:nvSpPr>
+          <p:cNvPr id="67" name="TextBox 66"/>
+          <p:cNvSpPr txBox="1"/>
+          <p:nvPr/>
+        </p:nvSpPr>
+        <p:spPr>
+          <a:xfrm>
+            <a:off x="11140838" y="899776"/>
+            <a:ext cx="677878" cy="369332"/>
+          </a:xfrm>
+          <a:prstGeom prst="rect">
+            <a:avLst/>
+          </a:prstGeom>
+          <a:noFill/>
+        </p:spPr>
+        <p:txBody>
+          <a:bodyPr wrap="none" rtlCol="0">
+            <a:spAutoFit/>
+          </a:bodyPr>
+          <a:lstStyle/>
+          <a:p>
+            <a:pPr algn="ctr"/>
+            <a:r>
+              <a:rPr lang="en-US" dirty="0"/>
+              <a:t>point</a:t>
+            </a:r>
+          </a:p>
+        </p:txBody>
+      </p:sp>
+      <mc:AlternateContent xmlns:mc="http://schemas.openxmlformats.org/markup-compatibility/2006" xmlns:a14="http://schemas.microsoft.com/office/drawing/2010/main">
+        <mc:Choice Requires="a14">
+          <p:sp>
+            <p:nvSpPr>
+              <p:cNvPr id="68" name="Rectangle 67"/>
+              <p:cNvSpPr/>
+              <p:nvPr/>
+            </p:nvSpPr>
+            <p:spPr>
+              <a:xfrm>
+                <a:off x="10811096" y="2276309"/>
+                <a:ext cx="1337359" cy="349979"/>
+              </a:xfrm>
+              <a:prstGeom prst="rect">
+                <a:avLst/>
+              </a:prstGeom>
+              <a:solidFill>
+                <a:schemeClr val="accent6">
+                  <a:lumMod val="20000"/>
+                  <a:lumOff val="80000"/>
+                </a:schemeClr>
+              </a:solidFill>
+              <a:ln>
+                <a:solidFill>
+                  <a:schemeClr val="accent6">
+                    <a:lumMod val="50000"/>
+                  </a:schemeClr>
+                </a:solidFill>
+                <a:prstDash val="solid"/>
+              </a:ln>
+            </p:spPr>
+            <p:style>
+              <a:lnRef idx="2">
+                <a:schemeClr val="accent1">
+                  <a:shade val="50000"/>
+                </a:schemeClr>
+              </a:lnRef>
+              <a:fillRef idx="1">
+                <a:schemeClr val="accent1"/>
+              </a:fillRef>
+              <a:effectRef idx="0">
+                <a:schemeClr val="accent1"/>
+              </a:effectRef>
+              <a:fontRef idx="minor">
+                <a:schemeClr val="lt1"/>
+              </a:fontRef>
+            </p:style>
+            <p:txBody>
+              <a:bodyPr rtlCol="0" anchor="ctr"/>
+              <a:lstStyle/>
+              <a:p>
+                <a:pPr algn="ctr"/>
+                <a14:m>
+                  <m:oMath xmlns:m="http://schemas.openxmlformats.org/officeDocument/2006/math">
+                    <m:r>
+                      <a:rPr lang="en-US" b="0" i="1" smtClean="0">
+                        <a:solidFill>
+                          <a:schemeClr val="tx1"/>
+                        </a:solidFill>
+                        <a:latin typeface="Cambria Math" panose="02040503050406030204" pitchFamily="18" charset="0"/>
+                      </a:rPr>
+                      <m:t>𝑟</m:t>
+                    </m:r>
+                  </m:oMath>
+                </a14:m>
+                <a:r>
+                  <a:rPr lang="en-US" dirty="0">
+                    <a:solidFill>
+                      <a:schemeClr val="tx1"/>
+                    </a:solidFill>
+                  </a:rPr>
+                  <a:t> </a:t>
+                </a:r>
+                <a:r>
+                  <a:rPr lang="en-US" dirty="0">
+                    <a:solidFill>
+                      <a:schemeClr val="tx1"/>
+                    </a:solidFill>
+                    <a:latin typeface="Consolas" panose="020B0609020204030204" pitchFamily="49" charset="0"/>
+                  </a:rPr>
+                  <a:t>float</a:t>
+                </a:r>
+                <a:endParaRPr lang="en-US" dirty="0">
+                  <a:solidFill>
+                    <a:schemeClr val="tx1"/>
+                  </a:solidFill>
+                </a:endParaRPr>
+              </a:p>
+            </p:txBody>
+          </p:sp>
+        </mc:Choice>
+        <mc:Fallback xmlns="">
+          <p:sp>
+            <p:nvSpPr>
+              <p:cNvPr id="68" name="Rectangle 67"/>
+              <p:cNvSpPr>
+                <a:spLocks noRot="1" noChangeAspect="1" noMove="1" noResize="1" noEditPoints="1" noAdjustHandles="1" noChangeArrowheads="1" noChangeShapeType="1" noTextEdit="1"/>
+              </p:cNvSpPr>
+              <p:nvPr/>
+            </p:nvSpPr>
+            <p:spPr>
+              <a:xfrm>
+                <a:off x="10811096" y="2276309"/>
+                <a:ext cx="1337359" cy="349979"/>
+              </a:xfrm>
+              <a:prstGeom prst="rect">
+                <a:avLst/>
+              </a:prstGeom>
+              <a:blipFill>
+                <a:blip r:embed="rId16"/>
+                <a:stretch>
+                  <a:fillRect t="-8333" b="-26667"/>
+                </a:stretch>
+              </a:blipFill>
+              <a:ln>
+                <a:solidFill>
+                  <a:schemeClr val="accent6">
+                    <a:lumMod val="50000"/>
+                  </a:schemeClr>
+                </a:solidFill>
+                <a:prstDash val="solid"/>
+              </a:ln>
+            </p:spPr>
+            <p:txBody>
+              <a:bodyPr/>
+              <a:lstStyle/>
+              <a:p>
+                <a:r>
+                  <a:rPr lang="en-US">
+                    <a:noFill/>
+                  </a:rPr>
+                  <a:t> </a:t>
+                </a:r>
+              </a:p>
+            </p:txBody>
+          </p:sp>
+        </mc:Fallback>
+      </mc:AlternateContent>
+      <p:sp>
+        <p:nvSpPr>
+          <p:cNvPr id="12" name="Rectangle 11">
+            <a:extLst>
+              <a:ext uri="{FF2B5EF4-FFF2-40B4-BE49-F238E27FC236}">
+                <a16:creationId xmlns:a16="http://schemas.microsoft.com/office/drawing/2014/main" id="{564C2593-1FCE-9ED5-DD1C-DADE15AC0BF7}"/>
+              </a:ext>
+            </a:extLst>
+          </p:cNvPr>
+          <p:cNvSpPr/>
+          <p:nvPr/>
+        </p:nvSpPr>
+        <p:spPr>
+          <a:xfrm>
+            <a:off x="9113434" y="3842840"/>
+            <a:ext cx="1337359" cy="519840"/>
+          </a:xfrm>
+          <a:prstGeom prst="rect">
+            <a:avLst/>
+          </a:prstGeom>
+          <a:solidFill>
+            <a:schemeClr val="accent4">
+              <a:lumMod val="20000"/>
+              <a:lumOff val="80000"/>
+            </a:schemeClr>
+          </a:solidFill>
+          <a:ln>
+            <a:solidFill>
+              <a:schemeClr val="accent4">
+                <a:lumMod val="50000"/>
+              </a:schemeClr>
+            </a:solidFill>
+            <a:prstDash val="solid"/>
+          </a:ln>
+        </p:spPr>
+        <p:style>
+          <a:lnRef idx="2">
+            <a:schemeClr val="accent1">
+              <a:shade val="50000"/>
+            </a:schemeClr>
+          </a:lnRef>
+          <a:fillRef idx="1">
+            <a:schemeClr val="accent1"/>
+          </a:fillRef>
+          <a:effectRef idx="0">
+            <a:schemeClr val="accent1"/>
+          </a:effectRef>
+          <a:fontRef idx="minor">
+            <a:schemeClr val="lt1"/>
+          </a:fontRef>
+        </p:style>
+        <p:txBody>
+          <a:bodyPr rtlCol="0" anchor="ctr"/>
+          <a:lstStyle/>
+          <a:p>
+            <a:pPr algn="ctr"/>
+            <a:r>
+              <a:rPr lang="en-US" dirty="0">
+                <a:solidFill>
+                  <a:schemeClr val="tx1"/>
+                </a:solidFill>
+              </a:rPr>
+              <a:t>surface bytes </a:t>
+            </a:r>
+            <a:r>
+              <a:rPr lang="en-US" dirty="0" err="1">
+                <a:solidFill>
+                  <a:schemeClr val="tx1"/>
+                </a:solidFill>
+                <a:latin typeface="Consolas" panose="020B0609020204030204" pitchFamily="49" charset="0"/>
+              </a:rPr>
+              <a:t>uint</a:t>
+            </a:r>
+            <a:endParaRPr lang="en-US" dirty="0">
+              <a:solidFill>
+                <a:schemeClr val="tx1"/>
+              </a:solidFill>
+              <a:latin typeface="Consolas" panose="020B0609020204030204" pitchFamily="49" charset="0"/>
+            </a:endParaRPr>
+          </a:p>
+        </p:txBody>
+      </p:sp>
+      <p:sp>
+        <p:nvSpPr>
+          <p:cNvPr id="13" name="Rectangle 12">
+            <a:extLst>
+              <a:ext uri="{FF2B5EF4-FFF2-40B4-BE49-F238E27FC236}">
+                <a16:creationId xmlns:a16="http://schemas.microsoft.com/office/drawing/2014/main" id="{D189BFC8-D173-BDAE-0A59-D3B36847EB19}"/>
+              </a:ext>
+            </a:extLst>
+          </p:cNvPr>
+          <p:cNvSpPr/>
+          <p:nvPr/>
+        </p:nvSpPr>
+        <p:spPr>
+          <a:xfrm>
+            <a:off x="9113433" y="4349995"/>
+            <a:ext cx="1337359" cy="519840"/>
+          </a:xfrm>
+          <a:prstGeom prst="rect">
+            <a:avLst/>
+          </a:prstGeom>
+          <a:solidFill>
+            <a:schemeClr val="accent4">
+              <a:lumMod val="20000"/>
+              <a:lumOff val="80000"/>
+            </a:schemeClr>
+          </a:solidFill>
+          <a:ln>
+            <a:solidFill>
+              <a:schemeClr val="accent4">
+                <a:lumMod val="50000"/>
+              </a:schemeClr>
+            </a:solidFill>
+            <a:prstDash val="solid"/>
+          </a:ln>
+        </p:spPr>
+        <p:style>
+          <a:lnRef idx="2">
+            <a:schemeClr val="accent1">
+              <a:shade val="50000"/>
+            </a:schemeClr>
+          </a:lnRef>
+          <a:fillRef idx="1">
+            <a:schemeClr val="accent1"/>
+          </a:fillRef>
+          <a:effectRef idx="0">
+            <a:schemeClr val="accent1"/>
+          </a:effectRef>
+          <a:fontRef idx="minor">
+            <a:schemeClr val="lt1"/>
+          </a:fontRef>
+        </p:style>
+        <p:txBody>
+          <a:bodyPr rtlCol="0" anchor="ctr"/>
+          <a:lstStyle/>
+          <a:p>
+            <a:pPr algn="ctr"/>
+            <a:r>
+              <a:rPr lang="en-US" dirty="0">
+                <a:solidFill>
+                  <a:schemeClr val="tx1"/>
+                </a:solidFill>
+              </a:rPr>
+              <a:t>volume bytes </a:t>
+            </a:r>
+            <a:r>
+              <a:rPr lang="en-US" dirty="0" err="1">
+                <a:solidFill>
+                  <a:schemeClr val="tx1"/>
+                </a:solidFill>
+                <a:latin typeface="Consolas" panose="020B0609020204030204" pitchFamily="49" charset="0"/>
+              </a:rPr>
+              <a:t>uint</a:t>
+            </a:r>
+            <a:endParaRPr lang="en-US" dirty="0">
+              <a:solidFill>
+                <a:schemeClr val="tx1"/>
+              </a:solidFill>
+              <a:latin typeface="Consolas" panose="020B0609020204030204" pitchFamily="49" charset="0"/>
+            </a:endParaRPr>
+          </a:p>
+        </p:txBody>
+      </p:sp>
+      <p:sp>
+        <p:nvSpPr>
+          <p:cNvPr id="14" name="Rectangle 13">
+            <a:extLst>
+              <a:ext uri="{FF2B5EF4-FFF2-40B4-BE49-F238E27FC236}">
+                <a16:creationId xmlns:a16="http://schemas.microsoft.com/office/drawing/2014/main" id="{C45A95BE-23B9-3B11-B079-6DBE46C50DE6}"/>
+              </a:ext>
+            </a:extLst>
+          </p:cNvPr>
+          <p:cNvSpPr/>
+          <p:nvPr/>
+        </p:nvSpPr>
+        <p:spPr>
+          <a:xfrm>
+            <a:off x="9113433" y="5569406"/>
+            <a:ext cx="1337359" cy="798737"/>
+          </a:xfrm>
+          <a:prstGeom prst="rect">
+            <a:avLst/>
+          </a:prstGeom>
+          <a:solidFill>
+            <a:srgbClr val="E1CCF0"/>
+          </a:solidFill>
+          <a:ln>
+            <a:solidFill>
+              <a:srgbClr val="7030A0"/>
+            </a:solidFill>
+            <a:prstDash val="solid"/>
+          </a:ln>
+        </p:spPr>
+        <p:style>
+          <a:lnRef idx="2">
+            <a:schemeClr val="accent1">
+              <a:shade val="50000"/>
+            </a:schemeClr>
+          </a:lnRef>
+          <a:fillRef idx="1">
+            <a:schemeClr val="accent1"/>
+          </a:fillRef>
+          <a:effectRef idx="0">
+            <a:schemeClr val="accent1"/>
+          </a:effectRef>
+          <a:fontRef idx="minor">
+            <a:schemeClr val="lt1"/>
+          </a:fontRef>
+        </p:style>
+        <p:txBody>
+          <a:bodyPr rtlCol="0" anchor="ctr"/>
+          <a:lstStyle/>
+          <a:p>
+            <a:pPr algn="ctr"/>
+            <a:r>
+              <a:rPr lang="en-US" dirty="0">
+                <a:solidFill>
+                  <a:schemeClr val="tx1"/>
+                </a:solidFill>
+              </a:rPr>
+              <a:t>volume data</a:t>
+            </a:r>
+          </a:p>
+          <a:p>
+            <a:pPr algn="ctr"/>
+            <a:r>
+              <a:rPr lang="en-US" dirty="0">
+                <a:solidFill>
+                  <a:schemeClr val="tx1"/>
+                </a:solidFill>
+              </a:rPr>
+              <a:t>(binary)</a:t>
+            </a:r>
+          </a:p>
+        </p:txBody>
+      </p:sp>
+    </p:spTree>
+    <p:extLst>
+      <p:ext uri="{BB962C8B-B14F-4D97-AF65-F5344CB8AC3E}">
+        <p14:creationId xmlns:p14="http://schemas.microsoft.com/office/powerpoint/2010/main" val="3962949377"/>
+      </p:ext>
+    </p:extLst>
+  </p:cSld>
+  <p:clrMapOvr>
+    <a:masterClrMapping/>
+  </p:clrMapOvr>
+</p:sld>
+</file>
+
 <file path=ppt/theme/theme1.xml><?xml version="1.0" encoding="utf-8"?>
 <a:theme xmlns:a="http://schemas.openxmlformats.org/drawingml/2006/main" name="Office Theme">
   <a:themeElements>

</xml_diff>

<commit_message>
added a GLFW OpenGL template
</commit_message>
<xml_diff>
--- a/docs/nwt_format.pptx
+++ b/docs/nwt_format.pptx
@@ -11914,7 +11914,7 @@
                     <a:schemeClr val="tx1"/>
                   </a:solidFill>
                 </a:rPr>
-                <a:t>#vertices 4 byte </a:t>
+                <a:t>#nodes 4 byte </a:t>
               </a:r>
               <a:r>
                 <a:rPr lang="en-US" dirty="0" err="1">
@@ -12095,7 +12095,7 @@
                   <a:schemeClr val="tx1"/>
                 </a:solidFill>
               </a:rPr>
-              <a:t>vertices</a:t>
+              <a:t>nodes</a:t>
             </a:r>
           </a:p>
         </p:txBody>
@@ -12160,8 +12160,8 @@
           </a:p>
         </p:txBody>
       </p:sp>
-      <mc:AlternateContent xmlns:mc="http://schemas.openxmlformats.org/markup-compatibility/2006" xmlns:a14="http://schemas.microsoft.com/office/drawing/2010/main">
-        <mc:Choice Requires="a14">
+      <mc:AlternateContent xmlns:mc="http://schemas.openxmlformats.org/markup-compatibility/2006">
+        <mc:Choice xmlns:a14="http://schemas.microsoft.com/office/drawing/2010/main" Requires="a14">
           <p:sp>
             <p:nvSpPr>
               <p:cNvPr id="25" name="Rectangle 24"/>
@@ -12235,7 +12235,7 @@
                               </a:solidFill>
                               <a:latin typeface="Cambria Math" panose="02040503050406030204" pitchFamily="18" charset="0"/>
                             </a:rPr>
-                            <m:t>𝑣</m:t>
+                            <m:t>𝑛</m:t>
                           </m:r>
                         </m:e>
                         <m:sub>
@@ -12262,7 +12262,7 @@
             </p:txBody>
           </p:sp>
         </mc:Choice>
-        <mc:Fallback xmlns="">
+        <mc:Fallback>
           <p:sp>
             <p:nvSpPr>
               <p:cNvPr id="25" name="Rectangle 24"/>
@@ -13203,8 +13203,8 @@
         </p:nvSpPr>
         <p:spPr>
           <a:xfrm>
-            <a:off x="7653451" y="165438"/>
-            <a:ext cx="767967" cy="369332"/>
+            <a:off x="7704652" y="165438"/>
+            <a:ext cx="665567" cy="369332"/>
           </a:xfrm>
           <a:prstGeom prst="rect">
             <a:avLst/>
@@ -13220,7 +13220,7 @@
             <a:pPr algn="ctr"/>
             <a:r>
               <a:rPr lang="en-US" dirty="0"/>
-              <a:t>vertex</a:t>
+              <a:t>node</a:t>
             </a:r>
           </a:p>
         </p:txBody>
@@ -13306,8 +13306,8 @@
           </a:fontRef>
         </p:style>
       </p:cxnSp>
-      <mc:AlternateContent xmlns:mc="http://schemas.openxmlformats.org/markup-compatibility/2006" xmlns:a14="http://schemas.microsoft.com/office/drawing/2010/main">
-        <mc:Choice Requires="a14">
+      <mc:AlternateContent xmlns:mc="http://schemas.openxmlformats.org/markup-compatibility/2006">
+        <mc:Choice xmlns:a14="http://schemas.microsoft.com/office/drawing/2010/main" Requires="a14">
           <p:sp>
             <p:nvSpPr>
               <p:cNvPr id="47" name="Rectangle 46"/>
@@ -13379,7 +13379,7 @@
                             </a:solidFill>
                             <a:latin typeface="Cambria Math" panose="02040503050406030204" pitchFamily="18" charset="0"/>
                           </a:rPr>
-                          <m:t>𝑣</m:t>
+                          <m:t>𝑛</m:t>
                         </m:r>
                       </m:e>
                       <m:sub>
@@ -13417,7 +13417,7 @@
             </p:txBody>
           </p:sp>
         </mc:Choice>
-        <mc:Fallback xmlns="">
+        <mc:Fallback>
           <p:sp>
             <p:nvSpPr>
               <p:cNvPr id="47" name="Rectangle 46"/>
@@ -13435,7 +13435,7 @@
                 <a:avLst/>
               </a:prstGeom>
               <a:blipFill>
-                <a:blip r:embed="rId9"/>
+                <a:blip r:embed="rId8"/>
                 <a:stretch>
                   <a:fillRect t="-10169" b="-27119"/>
                 </a:stretch>
@@ -13464,8 +13464,8 @@
           </p:sp>
         </mc:Fallback>
       </mc:AlternateContent>
-      <mc:AlternateContent xmlns:mc="http://schemas.openxmlformats.org/markup-compatibility/2006" xmlns:a14="http://schemas.microsoft.com/office/drawing/2010/main">
-        <mc:Choice Requires="a14">
+      <mc:AlternateContent xmlns:mc="http://schemas.openxmlformats.org/markup-compatibility/2006">
+        <mc:Choice xmlns:a14="http://schemas.microsoft.com/office/drawing/2010/main" Requires="a14">
           <p:sp>
             <p:nvSpPr>
               <p:cNvPr id="48" name="Rectangle 47"/>
@@ -13537,7 +13537,7 @@
                             </a:solidFill>
                             <a:latin typeface="Cambria Math" panose="02040503050406030204" pitchFamily="18" charset="0"/>
                           </a:rPr>
-                          <m:t>𝑣</m:t>
+                          <m:t>𝑛</m:t>
                         </m:r>
                       </m:e>
                       <m:sub>
@@ -13580,7 +13580,7 @@
             </p:txBody>
           </p:sp>
         </mc:Choice>
-        <mc:Fallback xmlns="">
+        <mc:Fallback>
           <p:sp>
             <p:nvSpPr>
               <p:cNvPr id="48" name="Rectangle 47"/>
@@ -13598,7 +13598,7 @@
                 <a:avLst/>
               </a:prstGeom>
               <a:blipFill>
-                <a:blip r:embed="rId10"/>
+                <a:blip r:embed="rId9"/>
                 <a:stretch>
                   <a:fillRect t="-10000" b="-26667"/>
                 </a:stretch>
@@ -13703,8 +13703,8 @@
           </a:p>
         </p:txBody>
       </p:sp>
-      <mc:AlternateContent xmlns:mc="http://schemas.openxmlformats.org/markup-compatibility/2006" xmlns:a14="http://schemas.microsoft.com/office/drawing/2010/main">
-        <mc:Choice Requires="a14">
+      <mc:AlternateContent xmlns:mc="http://schemas.openxmlformats.org/markup-compatibility/2006">
+        <mc:Choice xmlns:a14="http://schemas.microsoft.com/office/drawing/2010/main" Requires="a14">
           <p:sp>
             <p:nvSpPr>
               <p:cNvPr id="52" name="Rectangle 51"/>
@@ -13794,13 +13794,13 @@
                       </m:sSubPr>
                       <m:e>
                         <m:r>
-                          <a:rPr lang="en-US" i="1">
+                          <a:rPr lang="en-US" b="0" i="1" smtClean="0">
                             <a:solidFill>
                               <a:schemeClr val="tx1"/>
                             </a:solidFill>
                             <a:latin typeface="Cambria Math" panose="02040503050406030204" pitchFamily="18" charset="0"/>
                           </a:rPr>
-                          <m:t>𝑣</m:t>
+                          <m:t>𝑛</m:t>
                         </m:r>
                       </m:e>
                       <m:sub>
@@ -13837,13 +13837,13 @@
                       </m:sSubPr>
                       <m:e>
                         <m:r>
-                          <a:rPr lang="en-US" i="1">
+                          <a:rPr lang="en-US" b="0" i="1" smtClean="0">
                             <a:solidFill>
                               <a:schemeClr val="tx1"/>
                             </a:solidFill>
                             <a:latin typeface="Cambria Math" panose="02040503050406030204" pitchFamily="18" charset="0"/>
                           </a:rPr>
-                          <m:t>𝑣</m:t>
+                          <m:t>𝑛</m:t>
                         </m:r>
                       </m:e>
                       <m:sub>
@@ -13897,7 +13897,7 @@
             </p:txBody>
           </p:sp>
         </mc:Choice>
-        <mc:Fallback xmlns="">
+        <mc:Fallback>
           <p:sp>
             <p:nvSpPr>
               <p:cNvPr id="52" name="Rectangle 51"/>
@@ -13915,7 +13915,7 @@
                 <a:avLst/>
               </a:prstGeom>
               <a:blipFill>
-                <a:blip r:embed="rId11"/>
+                <a:blip r:embed="rId10"/>
                 <a:stretch>
                   <a:fillRect l="-2715" r="-5882" b="-4570"/>
                 </a:stretch>

</xml_diff>

<commit_message>
added a crop function to the field class
</commit_message>
<xml_diff>
--- a/docs/nwt_format.pptx
+++ b/docs/nwt_format.pptx
@@ -245,7 +245,7 @@
           <a:p>
             <a:fld id="{6CC5352D-349F-485B-9CFD-C06486738278}" type="datetimeFigureOut">
               <a:rPr lang="en-US" smtClean="0"/>
-              <a:t>4/18/2023</a:t>
+              <a:t>7/29/2024</a:t>
             </a:fld>
             <a:endParaRPr lang="en-US"/>
           </a:p>
@@ -413,7 +413,7 @@
           <a:p>
             <a:fld id="{6CC5352D-349F-485B-9CFD-C06486738278}" type="datetimeFigureOut">
               <a:rPr lang="en-US" smtClean="0"/>
-              <a:t>4/18/2023</a:t>
+              <a:t>7/29/2024</a:t>
             </a:fld>
             <a:endParaRPr lang="en-US"/>
           </a:p>
@@ -591,7 +591,7 @@
           <a:p>
             <a:fld id="{6CC5352D-349F-485B-9CFD-C06486738278}" type="datetimeFigureOut">
               <a:rPr lang="en-US" smtClean="0"/>
-              <a:t>4/18/2023</a:t>
+              <a:t>7/29/2024</a:t>
             </a:fld>
             <a:endParaRPr lang="en-US"/>
           </a:p>
@@ -759,7 +759,7 @@
           <a:p>
             <a:fld id="{6CC5352D-349F-485B-9CFD-C06486738278}" type="datetimeFigureOut">
               <a:rPr lang="en-US" smtClean="0"/>
-              <a:t>4/18/2023</a:t>
+              <a:t>7/29/2024</a:t>
             </a:fld>
             <a:endParaRPr lang="en-US"/>
           </a:p>
@@ -1004,7 +1004,7 @@
           <a:p>
             <a:fld id="{6CC5352D-349F-485B-9CFD-C06486738278}" type="datetimeFigureOut">
               <a:rPr lang="en-US" smtClean="0"/>
-              <a:t>4/18/2023</a:t>
+              <a:t>7/29/2024</a:t>
             </a:fld>
             <a:endParaRPr lang="en-US"/>
           </a:p>
@@ -1233,7 +1233,7 @@
           <a:p>
             <a:fld id="{6CC5352D-349F-485B-9CFD-C06486738278}" type="datetimeFigureOut">
               <a:rPr lang="en-US" smtClean="0"/>
-              <a:t>4/18/2023</a:t>
+              <a:t>7/29/2024</a:t>
             </a:fld>
             <a:endParaRPr lang="en-US"/>
           </a:p>
@@ -1597,7 +1597,7 @@
           <a:p>
             <a:fld id="{6CC5352D-349F-485B-9CFD-C06486738278}" type="datetimeFigureOut">
               <a:rPr lang="en-US" smtClean="0"/>
-              <a:t>4/18/2023</a:t>
+              <a:t>7/29/2024</a:t>
             </a:fld>
             <a:endParaRPr lang="en-US"/>
           </a:p>
@@ -1714,7 +1714,7 @@
           <a:p>
             <a:fld id="{6CC5352D-349F-485B-9CFD-C06486738278}" type="datetimeFigureOut">
               <a:rPr lang="en-US" smtClean="0"/>
-              <a:t>4/18/2023</a:t>
+              <a:t>7/29/2024</a:t>
             </a:fld>
             <a:endParaRPr lang="en-US"/>
           </a:p>
@@ -1809,7 +1809,7 @@
           <a:p>
             <a:fld id="{6CC5352D-349F-485B-9CFD-C06486738278}" type="datetimeFigureOut">
               <a:rPr lang="en-US" smtClean="0"/>
-              <a:t>4/18/2023</a:t>
+              <a:t>7/29/2024</a:t>
             </a:fld>
             <a:endParaRPr lang="en-US"/>
           </a:p>
@@ -2084,7 +2084,7 @@
           <a:p>
             <a:fld id="{6CC5352D-349F-485B-9CFD-C06486738278}" type="datetimeFigureOut">
               <a:rPr lang="en-US" smtClean="0"/>
-              <a:t>4/18/2023</a:t>
+              <a:t>7/29/2024</a:t>
             </a:fld>
             <a:endParaRPr lang="en-US"/>
           </a:p>
@@ -2336,7 +2336,7 @@
           <a:p>
             <a:fld id="{6CC5352D-349F-485B-9CFD-C06486738278}" type="datetimeFigureOut">
               <a:rPr lang="en-US" smtClean="0"/>
-              <a:t>4/18/2023</a:t>
+              <a:t>7/29/2024</a:t>
             </a:fld>
             <a:endParaRPr lang="en-US"/>
           </a:p>
@@ -2547,7 +2547,7 @@
           <a:p>
             <a:fld id="{6CC5352D-349F-485B-9CFD-C06486738278}" type="datetimeFigureOut">
               <a:rPr lang="en-US" smtClean="0"/>
-              <a:t>4/18/2023</a:t>
+              <a:t>7/29/2024</a:t>
             </a:fld>
             <a:endParaRPr lang="en-US"/>
           </a:p>
@@ -11229,7 +11229,11 @@
           <a:p>
             <a:r>
               <a:rPr lang="en-US" dirty="0"/>
-              <a:t>File format for storing network topology, surfaces, and volume</a:t>
+              <a:t>File format for storing network, surfaces, volume, </a:t>
+            </a:r>
+            <a:r>
+              <a:rPr lang="en-US"/>
+              <a:t>and topology</a:t>
             </a:r>
             <a:br>
               <a:rPr lang="en-US" dirty="0"/>
@@ -12160,8 +12164,8 @@
           </a:p>
         </p:txBody>
       </p:sp>
-      <mc:AlternateContent xmlns:mc="http://schemas.openxmlformats.org/markup-compatibility/2006">
-        <mc:Choice xmlns:a14="http://schemas.microsoft.com/office/drawing/2010/main" Requires="a14">
+      <mc:AlternateContent xmlns:mc="http://schemas.openxmlformats.org/markup-compatibility/2006" xmlns:a14="http://schemas.microsoft.com/office/drawing/2010/main">
+        <mc:Choice Requires="a14">
           <p:sp>
             <p:nvSpPr>
               <p:cNvPr id="25" name="Rectangle 24"/>
@@ -12262,7 +12266,7 @@
             </p:txBody>
           </p:sp>
         </mc:Choice>
-        <mc:Fallback>
+        <mc:Fallback xmlns="">
           <p:sp>
             <p:nvSpPr>
               <p:cNvPr id="25" name="Rectangle 24"/>
@@ -13306,8 +13310,8 @@
           </a:fontRef>
         </p:style>
       </p:cxnSp>
-      <mc:AlternateContent xmlns:mc="http://schemas.openxmlformats.org/markup-compatibility/2006">
-        <mc:Choice xmlns:a14="http://schemas.microsoft.com/office/drawing/2010/main" Requires="a14">
+      <mc:AlternateContent xmlns:mc="http://schemas.openxmlformats.org/markup-compatibility/2006" xmlns:a14="http://schemas.microsoft.com/office/drawing/2010/main">
+        <mc:Choice Requires="a14">
           <p:sp>
             <p:nvSpPr>
               <p:cNvPr id="47" name="Rectangle 46"/>
@@ -13417,7 +13421,7 @@
             </p:txBody>
           </p:sp>
         </mc:Choice>
-        <mc:Fallback>
+        <mc:Fallback xmlns="">
           <p:sp>
             <p:nvSpPr>
               <p:cNvPr id="47" name="Rectangle 46"/>
@@ -13464,8 +13468,8 @@
           </p:sp>
         </mc:Fallback>
       </mc:AlternateContent>
-      <mc:AlternateContent xmlns:mc="http://schemas.openxmlformats.org/markup-compatibility/2006">
-        <mc:Choice xmlns:a14="http://schemas.microsoft.com/office/drawing/2010/main" Requires="a14">
+      <mc:AlternateContent xmlns:mc="http://schemas.openxmlformats.org/markup-compatibility/2006" xmlns:a14="http://schemas.microsoft.com/office/drawing/2010/main">
+        <mc:Choice Requires="a14">
           <p:sp>
             <p:nvSpPr>
               <p:cNvPr id="48" name="Rectangle 47"/>
@@ -13580,7 +13584,7 @@
             </p:txBody>
           </p:sp>
         </mc:Choice>
-        <mc:Fallback>
+        <mc:Fallback xmlns="">
           <p:sp>
             <p:nvSpPr>
               <p:cNvPr id="48" name="Rectangle 47"/>
@@ -13703,8 +13707,8 @@
           </a:p>
         </p:txBody>
       </p:sp>
-      <mc:AlternateContent xmlns:mc="http://schemas.openxmlformats.org/markup-compatibility/2006">
-        <mc:Choice xmlns:a14="http://schemas.microsoft.com/office/drawing/2010/main" Requires="a14">
+      <mc:AlternateContent xmlns:mc="http://schemas.openxmlformats.org/markup-compatibility/2006" xmlns:a14="http://schemas.microsoft.com/office/drawing/2010/main">
+        <mc:Choice Requires="a14">
           <p:sp>
             <p:nvSpPr>
               <p:cNvPr id="52" name="Rectangle 51"/>
@@ -13897,7 +13901,7 @@
             </p:txBody>
           </p:sp>
         </mc:Choice>
-        <mc:Fallback>
+        <mc:Fallback xmlns="">
           <p:sp>
             <p:nvSpPr>
               <p:cNvPr id="52" name="Rectangle 51"/>

</xml_diff>